<commit_message>
Schematic edit and explain input examples.
</commit_message>
<xml_diff>
--- a/assets/plots.pptx
+++ b/assets/plots.pptx
@@ -6,6 +6,8 @@
   </p:sldMasterIdLst>
   <p:sldIdLst>
     <p:sldId id="256" r:id="rId2"/>
+    <p:sldId id="257" r:id="rId3"/>
+    <p:sldId id="258" r:id="rId4"/>
   </p:sldIdLst>
   <p:sldSz cx="12192000" cy="6858000"/>
   <p:notesSz cx="6858000" cy="9144000"/>
@@ -104,6 +106,11 @@
       </a:defRPr>
     </a:lvl9pPr>
   </p:defaultTextStyle>
+  <p:extLst>
+    <p:ext uri="{EFAFB233-063F-42B5-8137-9DF3F51BA10A}">
+      <p15:sldGuideLst xmlns:p15="http://schemas.microsoft.com/office/powerpoint/2012/main"/>
+    </p:ext>
+  </p:extLst>
 </p:presentation>
 </file>
 
@@ -5137,6 +5144,3237 @@
 </p:sld>
 </file>
 
+<file path=ppt/slides/slide2.xml><?xml version="1.0" encoding="utf-8"?>
+<p:sld xmlns:a="http://schemas.openxmlformats.org/drawingml/2006/main" xmlns:r="http://schemas.openxmlformats.org/officeDocument/2006/relationships" xmlns:p="http://schemas.openxmlformats.org/presentationml/2006/main">
+  <p:cSld>
+    <p:spTree>
+      <p:nvGrpSpPr>
+        <p:cNvPr id="1" name=""/>
+        <p:cNvGrpSpPr/>
+        <p:nvPr/>
+      </p:nvGrpSpPr>
+      <p:grpSpPr>
+        <a:xfrm>
+          <a:off x="0" y="0"/>
+          <a:ext cx="0" cy="0"/>
+          <a:chOff x="0" y="0"/>
+          <a:chExt cx="0" cy="0"/>
+        </a:xfrm>
+      </p:grpSpPr>
+      <p:sp>
+        <p:nvSpPr>
+          <p:cNvPr id="4" name="Rectangle 3"/>
+          <p:cNvSpPr/>
+          <p:nvPr/>
+        </p:nvSpPr>
+        <p:spPr>
+          <a:xfrm>
+            <a:off x="543611" y="72077"/>
+            <a:ext cx="11184550" cy="6316316"/>
+          </a:xfrm>
+          <a:prstGeom prst="rect">
+            <a:avLst/>
+          </a:prstGeom>
+          <a:solidFill>
+            <a:schemeClr val="accent1">
+              <a:lumMod val="40000"/>
+              <a:lumOff val="60000"/>
+            </a:schemeClr>
+          </a:solidFill>
+          <a:ln>
+            <a:noFill/>
+          </a:ln>
+        </p:spPr>
+        <p:style>
+          <a:lnRef idx="2">
+            <a:schemeClr val="accent1">
+              <a:shade val="50000"/>
+            </a:schemeClr>
+          </a:lnRef>
+          <a:fillRef idx="1">
+            <a:schemeClr val="accent1"/>
+          </a:fillRef>
+          <a:effectRef idx="0">
+            <a:schemeClr val="accent1"/>
+          </a:effectRef>
+          <a:fontRef idx="minor">
+            <a:schemeClr val="lt1"/>
+          </a:fontRef>
+        </p:style>
+        <p:txBody>
+          <a:bodyPr rtlCol="0" anchor="ctr"/>
+          <a:lstStyle/>
+          <a:p>
+            <a:pPr algn="ctr"/>
+            <a:endParaRPr lang="en-CA"/>
+          </a:p>
+        </p:txBody>
+      </p:sp>
+      <p:sp>
+        <p:nvSpPr>
+          <p:cNvPr id="5" name="Rectangle 4"/>
+          <p:cNvSpPr/>
+          <p:nvPr/>
+        </p:nvSpPr>
+        <p:spPr>
+          <a:xfrm>
+            <a:off x="508887" y="1049572"/>
+            <a:ext cx="5592816" cy="5732891"/>
+          </a:xfrm>
+          <a:prstGeom prst="rect">
+            <a:avLst/>
+          </a:prstGeom>
+          <a:solidFill>
+            <a:schemeClr val="bg2">
+              <a:lumMod val="90000"/>
+            </a:schemeClr>
+          </a:solidFill>
+          <a:ln>
+            <a:noFill/>
+          </a:ln>
+        </p:spPr>
+        <p:style>
+          <a:lnRef idx="2">
+            <a:schemeClr val="accent1">
+              <a:shade val="50000"/>
+            </a:schemeClr>
+          </a:lnRef>
+          <a:fillRef idx="1">
+            <a:schemeClr val="accent1"/>
+          </a:fillRef>
+          <a:effectRef idx="0">
+            <a:schemeClr val="accent1"/>
+          </a:effectRef>
+          <a:fontRef idx="minor">
+            <a:schemeClr val="lt1"/>
+          </a:fontRef>
+        </p:style>
+        <p:txBody>
+          <a:bodyPr rtlCol="0" anchor="ctr"/>
+          <a:lstStyle/>
+          <a:p>
+            <a:pPr algn="ctr"/>
+            <a:endParaRPr lang="en-CA"/>
+          </a:p>
+        </p:txBody>
+      </p:sp>
+      <p:sp>
+        <p:nvSpPr>
+          <p:cNvPr id="6" name="Rectangle 5"/>
+          <p:cNvSpPr/>
+          <p:nvPr/>
+        </p:nvSpPr>
+        <p:spPr>
+          <a:xfrm>
+            <a:off x="6117605" y="1049572"/>
+            <a:ext cx="5602605" cy="5715989"/>
+          </a:xfrm>
+          <a:prstGeom prst="rect">
+            <a:avLst/>
+          </a:prstGeom>
+          <a:solidFill>
+            <a:schemeClr val="bg1">
+              <a:lumMod val="85000"/>
+            </a:schemeClr>
+          </a:solidFill>
+          <a:ln>
+            <a:noFill/>
+          </a:ln>
+        </p:spPr>
+        <p:style>
+          <a:lnRef idx="2">
+            <a:schemeClr val="accent1">
+              <a:shade val="50000"/>
+            </a:schemeClr>
+          </a:lnRef>
+          <a:fillRef idx="1">
+            <a:schemeClr val="accent1"/>
+          </a:fillRef>
+          <a:effectRef idx="0">
+            <a:schemeClr val="accent1"/>
+          </a:effectRef>
+          <a:fontRef idx="minor">
+            <a:schemeClr val="lt1"/>
+          </a:fontRef>
+        </p:style>
+        <p:txBody>
+          <a:bodyPr rtlCol="0" anchor="ctr"/>
+          <a:lstStyle/>
+          <a:p>
+            <a:pPr algn="ctr"/>
+            <a:endParaRPr lang="en-CA"/>
+          </a:p>
+        </p:txBody>
+      </p:sp>
+      <p:sp>
+        <p:nvSpPr>
+          <p:cNvPr id="7" name="Rectangle 6"/>
+          <p:cNvSpPr/>
+          <p:nvPr/>
+        </p:nvSpPr>
+        <p:spPr>
+          <a:xfrm>
+            <a:off x="508883" y="4770783"/>
+            <a:ext cx="11211325" cy="2011680"/>
+          </a:xfrm>
+          <a:prstGeom prst="rect">
+            <a:avLst/>
+          </a:prstGeom>
+          <a:solidFill>
+            <a:schemeClr val="bg1">
+              <a:lumMod val="75000"/>
+            </a:schemeClr>
+          </a:solidFill>
+          <a:ln>
+            <a:noFill/>
+          </a:ln>
+        </p:spPr>
+        <p:style>
+          <a:lnRef idx="2">
+            <a:schemeClr val="accent1">
+              <a:shade val="50000"/>
+            </a:schemeClr>
+          </a:lnRef>
+          <a:fillRef idx="1">
+            <a:schemeClr val="accent1"/>
+          </a:fillRef>
+          <a:effectRef idx="0">
+            <a:schemeClr val="accent1"/>
+          </a:effectRef>
+          <a:fontRef idx="minor">
+            <a:schemeClr val="lt1"/>
+          </a:fontRef>
+        </p:style>
+        <p:txBody>
+          <a:bodyPr rtlCol="0" anchor="ctr"/>
+          <a:lstStyle/>
+          <a:p>
+            <a:pPr algn="ctr"/>
+            <a:endParaRPr lang="en-CA"/>
+          </a:p>
+        </p:txBody>
+      </p:sp>
+      <p:sp>
+        <p:nvSpPr>
+          <p:cNvPr id="19" name="Rectangle 18"/>
+          <p:cNvSpPr/>
+          <p:nvPr/>
+        </p:nvSpPr>
+        <p:spPr>
+          <a:xfrm>
+            <a:off x="514846" y="2559986"/>
+            <a:ext cx="11205361" cy="892867"/>
+          </a:xfrm>
+          <a:prstGeom prst="rect">
+            <a:avLst/>
+          </a:prstGeom>
+          <a:solidFill>
+            <a:schemeClr val="bg1">
+              <a:lumMod val="50000"/>
+            </a:schemeClr>
+          </a:solidFill>
+          <a:ln>
+            <a:noFill/>
+          </a:ln>
+        </p:spPr>
+        <p:style>
+          <a:lnRef idx="2">
+            <a:schemeClr val="accent1">
+              <a:shade val="50000"/>
+            </a:schemeClr>
+          </a:lnRef>
+          <a:fillRef idx="1">
+            <a:schemeClr val="accent1"/>
+          </a:fillRef>
+          <a:effectRef idx="0">
+            <a:schemeClr val="accent1"/>
+          </a:effectRef>
+          <a:fontRef idx="minor">
+            <a:schemeClr val="lt1"/>
+          </a:fontRef>
+        </p:style>
+        <p:txBody>
+          <a:bodyPr rtlCol="0" anchor="ctr"/>
+          <a:lstStyle/>
+          <a:p>
+            <a:pPr algn="ctr"/>
+            <a:endParaRPr lang="en-CA"/>
+          </a:p>
+        </p:txBody>
+      </p:sp>
+      <p:sp>
+        <p:nvSpPr>
+          <p:cNvPr id="21" name="Rectangle 20"/>
+          <p:cNvSpPr/>
+          <p:nvPr/>
+        </p:nvSpPr>
+        <p:spPr>
+          <a:xfrm>
+            <a:off x="508875" y="1049572"/>
+            <a:ext cx="11211331" cy="677847"/>
+          </a:xfrm>
+          <a:prstGeom prst="rect">
+            <a:avLst/>
+          </a:prstGeom>
+          <a:solidFill>
+            <a:schemeClr val="bg1">
+              <a:lumMod val="65000"/>
+            </a:schemeClr>
+          </a:solidFill>
+          <a:ln>
+            <a:noFill/>
+          </a:ln>
+        </p:spPr>
+        <p:style>
+          <a:lnRef idx="2">
+            <a:schemeClr val="accent1">
+              <a:shade val="50000"/>
+            </a:schemeClr>
+          </a:lnRef>
+          <a:fillRef idx="1">
+            <a:schemeClr val="accent1"/>
+          </a:fillRef>
+          <a:effectRef idx="0">
+            <a:schemeClr val="accent1"/>
+          </a:effectRef>
+          <a:fontRef idx="minor">
+            <a:schemeClr val="lt1"/>
+          </a:fontRef>
+        </p:style>
+        <p:txBody>
+          <a:bodyPr rtlCol="0" anchor="ctr"/>
+          <a:lstStyle/>
+          <a:p>
+            <a:pPr algn="ctr"/>
+            <a:endParaRPr lang="en-CA"/>
+          </a:p>
+        </p:txBody>
+      </p:sp>
+      <p:sp>
+        <p:nvSpPr>
+          <p:cNvPr id="24" name="Rectangle 23"/>
+          <p:cNvSpPr/>
+          <p:nvPr/>
+        </p:nvSpPr>
+        <p:spPr>
+          <a:xfrm>
+            <a:off x="543610" y="3482669"/>
+            <a:ext cx="11176598" cy="1264915"/>
+          </a:xfrm>
+          <a:prstGeom prst="rect">
+            <a:avLst/>
+          </a:prstGeom>
+          <a:solidFill>
+            <a:schemeClr val="bg1">
+              <a:lumMod val="95000"/>
+            </a:schemeClr>
+          </a:solidFill>
+          <a:ln>
+            <a:noFill/>
+          </a:ln>
+        </p:spPr>
+        <p:style>
+          <a:lnRef idx="2">
+            <a:schemeClr val="accent1">
+              <a:shade val="50000"/>
+            </a:schemeClr>
+          </a:lnRef>
+          <a:fillRef idx="1">
+            <a:schemeClr val="accent1"/>
+          </a:fillRef>
+          <a:effectRef idx="0">
+            <a:schemeClr val="accent1"/>
+          </a:effectRef>
+          <a:fontRef idx="minor">
+            <a:schemeClr val="lt1"/>
+          </a:fontRef>
+        </p:style>
+        <p:txBody>
+          <a:bodyPr rtlCol="0" anchor="ctr"/>
+          <a:lstStyle/>
+          <a:p>
+            <a:pPr algn="ctr"/>
+            <a:endParaRPr lang="en-CA"/>
+          </a:p>
+        </p:txBody>
+      </p:sp>
+      <p:sp>
+        <p:nvSpPr>
+          <p:cNvPr id="30" name="Rectangle 29"/>
+          <p:cNvSpPr/>
+          <p:nvPr/>
+        </p:nvSpPr>
+        <p:spPr>
+          <a:xfrm>
+            <a:off x="508881" y="71562"/>
+            <a:ext cx="11211329" cy="6693999"/>
+          </a:xfrm>
+          <a:prstGeom prst="rect">
+            <a:avLst/>
+          </a:prstGeom>
+          <a:noFill/>
+          <a:ln w="38100">
+            <a:solidFill>
+              <a:schemeClr val="tx1"/>
+            </a:solidFill>
+          </a:ln>
+        </p:spPr>
+        <p:style>
+          <a:lnRef idx="2">
+            <a:schemeClr val="accent1">
+              <a:shade val="50000"/>
+            </a:schemeClr>
+          </a:lnRef>
+          <a:fillRef idx="1">
+            <a:schemeClr val="accent1"/>
+          </a:fillRef>
+          <a:effectRef idx="0">
+            <a:schemeClr val="accent1"/>
+          </a:effectRef>
+          <a:fontRef idx="minor">
+            <a:schemeClr val="lt1"/>
+          </a:fontRef>
+        </p:style>
+        <p:txBody>
+          <a:bodyPr rtlCol="0" anchor="ctr"/>
+          <a:lstStyle/>
+          <a:p>
+            <a:pPr algn="ctr"/>
+            <a:endParaRPr lang="en-CA"/>
+          </a:p>
+        </p:txBody>
+      </p:sp>
+      <p:cxnSp>
+        <p:nvCxnSpPr>
+          <p:cNvPr id="33" name="Straight Connector 32"/>
+          <p:cNvCxnSpPr/>
+          <p:nvPr/>
+        </p:nvCxnSpPr>
+        <p:spPr>
+          <a:xfrm>
+            <a:off x="508879" y="1045597"/>
+            <a:ext cx="11211331" cy="3975"/>
+          </a:xfrm>
+          <a:prstGeom prst="line">
+            <a:avLst/>
+          </a:prstGeom>
+          <a:ln w="28575"/>
+        </p:spPr>
+        <p:style>
+          <a:lnRef idx="1">
+            <a:schemeClr val="dk1"/>
+          </a:lnRef>
+          <a:fillRef idx="0">
+            <a:schemeClr val="dk1"/>
+          </a:fillRef>
+          <a:effectRef idx="0">
+            <a:schemeClr val="dk1"/>
+          </a:effectRef>
+          <a:fontRef idx="minor">
+            <a:schemeClr val="tx1"/>
+          </a:fontRef>
+        </p:style>
+      </p:cxnSp>
+      <p:cxnSp>
+        <p:nvCxnSpPr>
+          <p:cNvPr id="37" name="Straight Connector 36"/>
+          <p:cNvCxnSpPr/>
+          <p:nvPr/>
+        </p:nvCxnSpPr>
+        <p:spPr>
+          <a:xfrm>
+            <a:off x="6093752" y="71562"/>
+            <a:ext cx="44658" cy="6693999"/>
+          </a:xfrm>
+          <a:prstGeom prst="line">
+            <a:avLst/>
+          </a:prstGeom>
+          <a:ln w="38100">
+            <a:prstDash val="sysDash"/>
+          </a:ln>
+        </p:spPr>
+        <p:style>
+          <a:lnRef idx="1">
+            <a:schemeClr val="dk1"/>
+          </a:lnRef>
+          <a:fillRef idx="0">
+            <a:schemeClr val="dk1"/>
+          </a:fillRef>
+          <a:effectRef idx="0">
+            <a:schemeClr val="dk1"/>
+          </a:effectRef>
+          <a:fontRef idx="minor">
+            <a:schemeClr val="tx1"/>
+          </a:fontRef>
+        </p:style>
+      </p:cxnSp>
+      <p:cxnSp>
+        <p:nvCxnSpPr>
+          <p:cNvPr id="46" name="Straight Connector 45"/>
+          <p:cNvCxnSpPr/>
+          <p:nvPr/>
+        </p:nvCxnSpPr>
+        <p:spPr>
+          <a:xfrm>
+            <a:off x="508877" y="1990322"/>
+            <a:ext cx="11211333" cy="0"/>
+          </a:xfrm>
+          <a:prstGeom prst="line">
+            <a:avLst/>
+          </a:prstGeom>
+          <a:ln w="19050"/>
+        </p:spPr>
+        <p:style>
+          <a:lnRef idx="1">
+            <a:schemeClr val="dk1"/>
+          </a:lnRef>
+          <a:fillRef idx="0">
+            <a:schemeClr val="dk1"/>
+          </a:fillRef>
+          <a:effectRef idx="0">
+            <a:schemeClr val="dk1"/>
+          </a:effectRef>
+          <a:fontRef idx="minor">
+            <a:schemeClr val="tx1"/>
+          </a:fontRef>
+        </p:style>
+      </p:cxnSp>
+      <p:cxnSp>
+        <p:nvCxnSpPr>
+          <p:cNvPr id="47" name="Straight Connector 46"/>
+          <p:cNvCxnSpPr/>
+          <p:nvPr/>
+        </p:nvCxnSpPr>
+        <p:spPr>
+          <a:xfrm>
+            <a:off x="508877" y="1737358"/>
+            <a:ext cx="11211333" cy="0"/>
+          </a:xfrm>
+          <a:prstGeom prst="line">
+            <a:avLst/>
+          </a:prstGeom>
+          <a:ln w="19050"/>
+        </p:spPr>
+        <p:style>
+          <a:lnRef idx="1">
+            <a:schemeClr val="dk1"/>
+          </a:lnRef>
+          <a:fillRef idx="0">
+            <a:schemeClr val="dk1"/>
+          </a:fillRef>
+          <a:effectRef idx="0">
+            <a:schemeClr val="dk1"/>
+          </a:effectRef>
+          <a:fontRef idx="minor">
+            <a:schemeClr val="tx1"/>
+          </a:fontRef>
+        </p:style>
+      </p:cxnSp>
+      <p:cxnSp>
+        <p:nvCxnSpPr>
+          <p:cNvPr id="48" name="Straight Connector 47"/>
+          <p:cNvCxnSpPr/>
+          <p:nvPr/>
+        </p:nvCxnSpPr>
+        <p:spPr>
+          <a:xfrm>
+            <a:off x="508877" y="1261607"/>
+            <a:ext cx="11211333" cy="0"/>
+          </a:xfrm>
+          <a:prstGeom prst="line">
+            <a:avLst/>
+          </a:prstGeom>
+          <a:ln w="19050"/>
+        </p:spPr>
+        <p:style>
+          <a:lnRef idx="1">
+            <a:schemeClr val="dk1"/>
+          </a:lnRef>
+          <a:fillRef idx="0">
+            <a:schemeClr val="dk1"/>
+          </a:fillRef>
+          <a:effectRef idx="0">
+            <a:schemeClr val="dk1"/>
+          </a:effectRef>
+          <a:fontRef idx="minor">
+            <a:schemeClr val="tx1"/>
+          </a:fontRef>
+        </p:style>
+      </p:cxnSp>
+      <p:cxnSp>
+        <p:nvCxnSpPr>
+          <p:cNvPr id="49" name="Straight Connector 48"/>
+          <p:cNvCxnSpPr/>
+          <p:nvPr/>
+        </p:nvCxnSpPr>
+        <p:spPr>
+          <a:xfrm>
+            <a:off x="508877" y="1492196"/>
+            <a:ext cx="11211333" cy="0"/>
+          </a:xfrm>
+          <a:prstGeom prst="line">
+            <a:avLst/>
+          </a:prstGeom>
+          <a:ln w="19050"/>
+        </p:spPr>
+        <p:style>
+          <a:lnRef idx="1">
+            <a:schemeClr val="dk1"/>
+          </a:lnRef>
+          <a:fillRef idx="0">
+            <a:schemeClr val="dk1"/>
+          </a:fillRef>
+          <a:effectRef idx="0">
+            <a:schemeClr val="dk1"/>
+          </a:effectRef>
+          <a:fontRef idx="minor">
+            <a:schemeClr val="tx1"/>
+          </a:fontRef>
+        </p:style>
+      </p:cxnSp>
+      <p:cxnSp>
+        <p:nvCxnSpPr>
+          <p:cNvPr id="50" name="Straight Connector 49"/>
+          <p:cNvCxnSpPr/>
+          <p:nvPr/>
+        </p:nvCxnSpPr>
+        <p:spPr>
+          <a:xfrm>
+            <a:off x="508877" y="2569593"/>
+            <a:ext cx="11211333" cy="0"/>
+          </a:xfrm>
+          <a:prstGeom prst="line">
+            <a:avLst/>
+          </a:prstGeom>
+          <a:ln w="19050"/>
+        </p:spPr>
+        <p:style>
+          <a:lnRef idx="1">
+            <a:schemeClr val="dk1"/>
+          </a:lnRef>
+          <a:fillRef idx="0">
+            <a:schemeClr val="dk1"/>
+          </a:fillRef>
+          <a:effectRef idx="0">
+            <a:schemeClr val="dk1"/>
+          </a:effectRef>
+          <a:fontRef idx="minor">
+            <a:schemeClr val="tx1"/>
+          </a:fontRef>
+        </p:style>
+      </p:cxnSp>
+      <p:cxnSp>
+        <p:nvCxnSpPr>
+          <p:cNvPr id="51" name="Straight Connector 50"/>
+          <p:cNvCxnSpPr/>
+          <p:nvPr/>
+        </p:nvCxnSpPr>
+        <p:spPr>
+          <a:xfrm>
+            <a:off x="508877" y="2255520"/>
+            <a:ext cx="11211333" cy="0"/>
+          </a:xfrm>
+          <a:prstGeom prst="line">
+            <a:avLst/>
+          </a:prstGeom>
+          <a:ln w="19050"/>
+        </p:spPr>
+        <p:style>
+          <a:lnRef idx="1">
+            <a:schemeClr val="dk1"/>
+          </a:lnRef>
+          <a:fillRef idx="0">
+            <a:schemeClr val="dk1"/>
+          </a:fillRef>
+          <a:effectRef idx="0">
+            <a:schemeClr val="dk1"/>
+          </a:effectRef>
+          <a:fontRef idx="minor">
+            <a:schemeClr val="tx1"/>
+          </a:fontRef>
+        </p:style>
+      </p:cxnSp>
+      <p:cxnSp>
+        <p:nvCxnSpPr>
+          <p:cNvPr id="52" name="Straight Connector 51"/>
+          <p:cNvCxnSpPr/>
+          <p:nvPr/>
+        </p:nvCxnSpPr>
+        <p:spPr>
+          <a:xfrm>
+            <a:off x="508877" y="2880358"/>
+            <a:ext cx="11211333" cy="0"/>
+          </a:xfrm>
+          <a:prstGeom prst="line">
+            <a:avLst/>
+          </a:prstGeom>
+          <a:ln w="19050"/>
+        </p:spPr>
+        <p:style>
+          <a:lnRef idx="1">
+            <a:schemeClr val="dk1"/>
+          </a:lnRef>
+          <a:fillRef idx="0">
+            <a:schemeClr val="dk1"/>
+          </a:fillRef>
+          <a:effectRef idx="0">
+            <a:schemeClr val="dk1"/>
+          </a:effectRef>
+          <a:fontRef idx="minor">
+            <a:schemeClr val="tx1"/>
+          </a:fontRef>
+        </p:style>
+      </p:cxnSp>
+      <p:cxnSp>
+        <p:nvCxnSpPr>
+          <p:cNvPr id="53" name="Straight Connector 52"/>
+          <p:cNvCxnSpPr/>
+          <p:nvPr/>
+        </p:nvCxnSpPr>
+        <p:spPr>
+          <a:xfrm>
+            <a:off x="508877" y="3160644"/>
+            <a:ext cx="11211333" cy="0"/>
+          </a:xfrm>
+          <a:prstGeom prst="line">
+            <a:avLst/>
+          </a:prstGeom>
+          <a:ln w="19050"/>
+        </p:spPr>
+        <p:style>
+          <a:lnRef idx="1">
+            <a:schemeClr val="dk1"/>
+          </a:lnRef>
+          <a:fillRef idx="0">
+            <a:schemeClr val="dk1"/>
+          </a:fillRef>
+          <a:effectRef idx="0">
+            <a:schemeClr val="dk1"/>
+          </a:effectRef>
+          <a:fontRef idx="minor">
+            <a:schemeClr val="tx1"/>
+          </a:fontRef>
+        </p:style>
+      </p:cxnSp>
+      <p:cxnSp>
+        <p:nvCxnSpPr>
+          <p:cNvPr id="54" name="Straight Connector 53"/>
+          <p:cNvCxnSpPr/>
+          <p:nvPr/>
+        </p:nvCxnSpPr>
+        <p:spPr>
+          <a:xfrm>
+            <a:off x="508877" y="3462793"/>
+            <a:ext cx="11211333" cy="0"/>
+          </a:xfrm>
+          <a:prstGeom prst="line">
+            <a:avLst/>
+          </a:prstGeom>
+          <a:ln w="19050"/>
+        </p:spPr>
+        <p:style>
+          <a:lnRef idx="1">
+            <a:schemeClr val="dk1"/>
+          </a:lnRef>
+          <a:fillRef idx="0">
+            <a:schemeClr val="dk1"/>
+          </a:fillRef>
+          <a:effectRef idx="0">
+            <a:schemeClr val="dk1"/>
+          </a:effectRef>
+          <a:fontRef idx="minor">
+            <a:schemeClr val="tx1"/>
+          </a:fontRef>
+        </p:style>
+      </p:cxnSp>
+      <p:cxnSp>
+        <p:nvCxnSpPr>
+          <p:cNvPr id="55" name="Straight Connector 54"/>
+          <p:cNvCxnSpPr/>
+          <p:nvPr/>
+        </p:nvCxnSpPr>
+        <p:spPr>
+          <a:xfrm>
+            <a:off x="508877" y="3776867"/>
+            <a:ext cx="11211333" cy="0"/>
+          </a:xfrm>
+          <a:prstGeom prst="line">
+            <a:avLst/>
+          </a:prstGeom>
+          <a:ln w="19050"/>
+        </p:spPr>
+        <p:style>
+          <a:lnRef idx="1">
+            <a:schemeClr val="dk1"/>
+          </a:lnRef>
+          <a:fillRef idx="0">
+            <a:schemeClr val="dk1"/>
+          </a:fillRef>
+          <a:effectRef idx="0">
+            <a:schemeClr val="dk1"/>
+          </a:effectRef>
+          <a:fontRef idx="minor">
+            <a:schemeClr val="tx1"/>
+          </a:fontRef>
+        </p:style>
+      </p:cxnSp>
+      <p:cxnSp>
+        <p:nvCxnSpPr>
+          <p:cNvPr id="56" name="Straight Connector 55"/>
+          <p:cNvCxnSpPr/>
+          <p:nvPr/>
+        </p:nvCxnSpPr>
+        <p:spPr>
+          <a:xfrm>
+            <a:off x="508877" y="4162507"/>
+            <a:ext cx="11211333" cy="0"/>
+          </a:xfrm>
+          <a:prstGeom prst="line">
+            <a:avLst/>
+          </a:prstGeom>
+          <a:ln w="19050"/>
+        </p:spPr>
+        <p:style>
+          <a:lnRef idx="1">
+            <a:schemeClr val="dk1"/>
+          </a:lnRef>
+          <a:fillRef idx="0">
+            <a:schemeClr val="dk1"/>
+          </a:fillRef>
+          <a:effectRef idx="0">
+            <a:schemeClr val="dk1"/>
+          </a:effectRef>
+          <a:fontRef idx="minor">
+            <a:schemeClr val="tx1"/>
+          </a:fontRef>
+        </p:style>
+      </p:cxnSp>
+      <p:cxnSp>
+        <p:nvCxnSpPr>
+          <p:cNvPr id="57" name="Straight Connector 56"/>
+          <p:cNvCxnSpPr/>
+          <p:nvPr/>
+        </p:nvCxnSpPr>
+        <p:spPr>
+          <a:xfrm>
+            <a:off x="508877" y="4764819"/>
+            <a:ext cx="11211333" cy="0"/>
+          </a:xfrm>
+          <a:prstGeom prst="line">
+            <a:avLst/>
+          </a:prstGeom>
+          <a:ln w="19050"/>
+        </p:spPr>
+        <p:style>
+          <a:lnRef idx="1">
+            <a:schemeClr val="dk1"/>
+          </a:lnRef>
+          <a:fillRef idx="0">
+            <a:schemeClr val="dk1"/>
+          </a:fillRef>
+          <a:effectRef idx="0">
+            <a:schemeClr val="dk1"/>
+          </a:effectRef>
+          <a:fontRef idx="minor">
+            <a:schemeClr val="tx1"/>
+          </a:fontRef>
+        </p:style>
+      </p:cxnSp>
+      <p:sp>
+        <p:nvSpPr>
+          <p:cNvPr id="58" name="TextBox 57"/>
+          <p:cNvSpPr txBox="1"/>
+          <p:nvPr/>
+        </p:nvSpPr>
+        <p:spPr>
+          <a:xfrm>
+            <a:off x="543610" y="94927"/>
+            <a:ext cx="5578894" cy="307777"/>
+          </a:xfrm>
+          <a:prstGeom prst="rect">
+            <a:avLst/>
+          </a:prstGeom>
+          <a:noFill/>
+        </p:spPr>
+        <p:txBody>
+          <a:bodyPr wrap="square" rtlCol="0">
+            <a:spAutoFit/>
+          </a:bodyPr>
+          <a:lstStyle/>
+          <a:p>
+            <a:r>
+              <a:rPr lang="en-CA" sz="1400" b="1" dirty="0" smtClean="0"/>
+              <a:t>Sounding </a:t>
+            </a:r>
+            <a:r>
+              <a:rPr lang="en-CA" sz="1400" b="1" dirty="0" smtClean="0"/>
+              <a:t>1: 6 coincident Tx-Rx loops measuring the vertical response</a:t>
+            </a:r>
+            <a:endParaRPr lang="en-CA" sz="1400" b="1" dirty="0"/>
+          </a:p>
+        </p:txBody>
+      </p:sp>
+      <p:sp>
+        <p:nvSpPr>
+          <p:cNvPr id="59" name="TextBox 58"/>
+          <p:cNvSpPr txBox="1"/>
+          <p:nvPr/>
+        </p:nvSpPr>
+        <p:spPr>
+          <a:xfrm>
+            <a:off x="6101703" y="79513"/>
+            <a:ext cx="5618506" cy="307777"/>
+          </a:xfrm>
+          <a:prstGeom prst="rect">
+            <a:avLst/>
+          </a:prstGeom>
+          <a:noFill/>
+        </p:spPr>
+        <p:txBody>
+          <a:bodyPr wrap="square" rtlCol="0">
+            <a:spAutoFit/>
+          </a:bodyPr>
+          <a:lstStyle/>
+          <a:p>
+            <a:r>
+              <a:rPr lang="en-CA" sz="1400" b="1" dirty="0" smtClean="0"/>
+              <a:t>Sounding </a:t>
+            </a:r>
+            <a:r>
+              <a:rPr lang="en-CA" sz="1400" b="1" dirty="0" smtClean="0"/>
+              <a:t>2: 1 horizontal coplanar and 1 horizontal coaxial measurement</a:t>
+            </a:r>
+            <a:endParaRPr lang="en-CA" sz="1400" b="1" dirty="0"/>
+          </a:p>
+        </p:txBody>
+      </p:sp>
+      <p:cxnSp>
+        <p:nvCxnSpPr>
+          <p:cNvPr id="78" name="Straight Connector 77"/>
+          <p:cNvCxnSpPr/>
+          <p:nvPr/>
+        </p:nvCxnSpPr>
+        <p:spPr>
+          <a:xfrm>
+            <a:off x="508876" y="5608982"/>
+            <a:ext cx="11211333" cy="0"/>
+          </a:xfrm>
+          <a:prstGeom prst="line">
+            <a:avLst/>
+          </a:prstGeom>
+          <a:ln w="19050"/>
+        </p:spPr>
+        <p:style>
+          <a:lnRef idx="1">
+            <a:schemeClr val="dk1"/>
+          </a:lnRef>
+          <a:fillRef idx="0">
+            <a:schemeClr val="dk1"/>
+          </a:fillRef>
+          <a:effectRef idx="0">
+            <a:schemeClr val="dk1"/>
+          </a:effectRef>
+          <a:fontRef idx="minor">
+            <a:schemeClr val="tx1"/>
+          </a:fontRef>
+        </p:style>
+      </p:cxnSp>
+      <p:sp>
+        <p:nvSpPr>
+          <p:cNvPr id="3" name="Oval 2"/>
+          <p:cNvSpPr/>
+          <p:nvPr/>
+        </p:nvSpPr>
+        <p:spPr>
+          <a:xfrm>
+            <a:off x="1160892" y="708001"/>
+            <a:ext cx="405516" cy="103034"/>
+          </a:xfrm>
+          <a:prstGeom prst="ellipse">
+            <a:avLst/>
+          </a:prstGeom>
+          <a:noFill/>
+          <a:ln w="19050">
+            <a:solidFill>
+              <a:srgbClr val="FF0000"/>
+            </a:solidFill>
+          </a:ln>
+        </p:spPr>
+        <p:style>
+          <a:lnRef idx="2">
+            <a:schemeClr val="accent1">
+              <a:shade val="50000"/>
+            </a:schemeClr>
+          </a:lnRef>
+          <a:fillRef idx="1">
+            <a:schemeClr val="accent1"/>
+          </a:fillRef>
+          <a:effectRef idx="0">
+            <a:schemeClr val="accent1"/>
+          </a:effectRef>
+          <a:fontRef idx="minor">
+            <a:schemeClr val="lt1"/>
+          </a:fontRef>
+        </p:style>
+        <p:txBody>
+          <a:bodyPr rtlCol="0" anchor="ctr"/>
+          <a:lstStyle/>
+          <a:p>
+            <a:pPr algn="ctr"/>
+            <a:endParaRPr lang="en-CA"/>
+          </a:p>
+        </p:txBody>
+      </p:sp>
+      <p:sp>
+        <p:nvSpPr>
+          <p:cNvPr id="66" name="Oval 65"/>
+          <p:cNvSpPr/>
+          <p:nvPr/>
+        </p:nvSpPr>
+        <p:spPr>
+          <a:xfrm>
+            <a:off x="1160892" y="764486"/>
+            <a:ext cx="405516" cy="103034"/>
+          </a:xfrm>
+          <a:prstGeom prst="ellipse">
+            <a:avLst/>
+          </a:prstGeom>
+          <a:noFill/>
+          <a:ln w="19050">
+            <a:solidFill>
+              <a:schemeClr val="tx1"/>
+            </a:solidFill>
+          </a:ln>
+        </p:spPr>
+        <p:style>
+          <a:lnRef idx="2">
+            <a:schemeClr val="accent1">
+              <a:shade val="50000"/>
+            </a:schemeClr>
+          </a:lnRef>
+          <a:fillRef idx="1">
+            <a:schemeClr val="accent1"/>
+          </a:fillRef>
+          <a:effectRef idx="0">
+            <a:schemeClr val="accent1"/>
+          </a:effectRef>
+          <a:fontRef idx="minor">
+            <a:schemeClr val="lt1"/>
+          </a:fontRef>
+        </p:style>
+        <p:txBody>
+          <a:bodyPr rtlCol="0" anchor="ctr"/>
+          <a:lstStyle/>
+          <a:p>
+            <a:pPr algn="ctr"/>
+            <a:endParaRPr lang="en-CA"/>
+          </a:p>
+        </p:txBody>
+      </p:sp>
+      <p:sp>
+        <p:nvSpPr>
+          <p:cNvPr id="67" name="Oval 66"/>
+          <p:cNvSpPr/>
+          <p:nvPr/>
+        </p:nvSpPr>
+        <p:spPr>
+          <a:xfrm>
+            <a:off x="1781092" y="719515"/>
+            <a:ext cx="405516" cy="103034"/>
+          </a:xfrm>
+          <a:prstGeom prst="ellipse">
+            <a:avLst/>
+          </a:prstGeom>
+          <a:noFill/>
+          <a:ln w="19050">
+            <a:solidFill>
+              <a:srgbClr val="FF0000"/>
+            </a:solidFill>
+          </a:ln>
+        </p:spPr>
+        <p:style>
+          <a:lnRef idx="2">
+            <a:schemeClr val="accent1">
+              <a:shade val="50000"/>
+            </a:schemeClr>
+          </a:lnRef>
+          <a:fillRef idx="1">
+            <a:schemeClr val="accent1"/>
+          </a:fillRef>
+          <a:effectRef idx="0">
+            <a:schemeClr val="accent1"/>
+          </a:effectRef>
+          <a:fontRef idx="minor">
+            <a:schemeClr val="lt1"/>
+          </a:fontRef>
+        </p:style>
+        <p:txBody>
+          <a:bodyPr rtlCol="0" anchor="ctr"/>
+          <a:lstStyle/>
+          <a:p>
+            <a:pPr algn="ctr"/>
+            <a:endParaRPr lang="en-CA"/>
+          </a:p>
+        </p:txBody>
+      </p:sp>
+      <p:sp>
+        <p:nvSpPr>
+          <p:cNvPr id="68" name="Oval 67"/>
+          <p:cNvSpPr/>
+          <p:nvPr/>
+        </p:nvSpPr>
+        <p:spPr>
+          <a:xfrm>
+            <a:off x="1781092" y="776000"/>
+            <a:ext cx="405516" cy="103034"/>
+          </a:xfrm>
+          <a:prstGeom prst="ellipse">
+            <a:avLst/>
+          </a:prstGeom>
+          <a:noFill/>
+          <a:ln w="19050">
+            <a:solidFill>
+              <a:schemeClr val="tx1"/>
+            </a:solidFill>
+          </a:ln>
+        </p:spPr>
+        <p:style>
+          <a:lnRef idx="2">
+            <a:schemeClr val="accent1">
+              <a:shade val="50000"/>
+            </a:schemeClr>
+          </a:lnRef>
+          <a:fillRef idx="1">
+            <a:schemeClr val="accent1"/>
+          </a:fillRef>
+          <a:effectRef idx="0">
+            <a:schemeClr val="accent1"/>
+          </a:effectRef>
+          <a:fontRef idx="minor">
+            <a:schemeClr val="lt1"/>
+          </a:fontRef>
+        </p:style>
+        <p:txBody>
+          <a:bodyPr rtlCol="0" anchor="ctr"/>
+          <a:lstStyle/>
+          <a:p>
+            <a:pPr algn="ctr"/>
+            <a:endParaRPr lang="en-CA"/>
+          </a:p>
+        </p:txBody>
+      </p:sp>
+      <p:sp>
+        <p:nvSpPr>
+          <p:cNvPr id="69" name="Oval 68"/>
+          <p:cNvSpPr/>
+          <p:nvPr/>
+        </p:nvSpPr>
+        <p:spPr>
+          <a:xfrm>
+            <a:off x="2433103" y="704822"/>
+            <a:ext cx="405516" cy="103034"/>
+          </a:xfrm>
+          <a:prstGeom prst="ellipse">
+            <a:avLst/>
+          </a:prstGeom>
+          <a:noFill/>
+          <a:ln w="19050">
+            <a:solidFill>
+              <a:srgbClr val="FF0000"/>
+            </a:solidFill>
+          </a:ln>
+        </p:spPr>
+        <p:style>
+          <a:lnRef idx="2">
+            <a:schemeClr val="accent1">
+              <a:shade val="50000"/>
+            </a:schemeClr>
+          </a:lnRef>
+          <a:fillRef idx="1">
+            <a:schemeClr val="accent1"/>
+          </a:fillRef>
+          <a:effectRef idx="0">
+            <a:schemeClr val="accent1"/>
+          </a:effectRef>
+          <a:fontRef idx="minor">
+            <a:schemeClr val="lt1"/>
+          </a:fontRef>
+        </p:style>
+        <p:txBody>
+          <a:bodyPr rtlCol="0" anchor="ctr"/>
+          <a:lstStyle/>
+          <a:p>
+            <a:pPr algn="ctr"/>
+            <a:endParaRPr lang="en-CA"/>
+          </a:p>
+        </p:txBody>
+      </p:sp>
+      <p:sp>
+        <p:nvSpPr>
+          <p:cNvPr id="70" name="Oval 69"/>
+          <p:cNvSpPr/>
+          <p:nvPr/>
+        </p:nvSpPr>
+        <p:spPr>
+          <a:xfrm>
+            <a:off x="2433103" y="761307"/>
+            <a:ext cx="405516" cy="103034"/>
+          </a:xfrm>
+          <a:prstGeom prst="ellipse">
+            <a:avLst/>
+          </a:prstGeom>
+          <a:noFill/>
+          <a:ln w="19050">
+            <a:solidFill>
+              <a:schemeClr val="tx1"/>
+            </a:solidFill>
+          </a:ln>
+        </p:spPr>
+        <p:style>
+          <a:lnRef idx="2">
+            <a:schemeClr val="accent1">
+              <a:shade val="50000"/>
+            </a:schemeClr>
+          </a:lnRef>
+          <a:fillRef idx="1">
+            <a:schemeClr val="accent1"/>
+          </a:fillRef>
+          <a:effectRef idx="0">
+            <a:schemeClr val="accent1"/>
+          </a:effectRef>
+          <a:fontRef idx="minor">
+            <a:schemeClr val="lt1"/>
+          </a:fontRef>
+        </p:style>
+        <p:txBody>
+          <a:bodyPr rtlCol="0" anchor="ctr"/>
+          <a:lstStyle/>
+          <a:p>
+            <a:pPr algn="ctr"/>
+            <a:endParaRPr lang="en-CA"/>
+          </a:p>
+        </p:txBody>
+      </p:sp>
+      <p:sp>
+        <p:nvSpPr>
+          <p:cNvPr id="71" name="Oval 70"/>
+          <p:cNvSpPr/>
+          <p:nvPr/>
+        </p:nvSpPr>
+        <p:spPr>
+          <a:xfrm>
+            <a:off x="3078678" y="704822"/>
+            <a:ext cx="405516" cy="103034"/>
+          </a:xfrm>
+          <a:prstGeom prst="ellipse">
+            <a:avLst/>
+          </a:prstGeom>
+          <a:noFill/>
+          <a:ln w="19050">
+            <a:solidFill>
+              <a:srgbClr val="FF0000"/>
+            </a:solidFill>
+          </a:ln>
+        </p:spPr>
+        <p:style>
+          <a:lnRef idx="2">
+            <a:schemeClr val="accent1">
+              <a:shade val="50000"/>
+            </a:schemeClr>
+          </a:lnRef>
+          <a:fillRef idx="1">
+            <a:schemeClr val="accent1"/>
+          </a:fillRef>
+          <a:effectRef idx="0">
+            <a:schemeClr val="accent1"/>
+          </a:effectRef>
+          <a:fontRef idx="minor">
+            <a:schemeClr val="lt1"/>
+          </a:fontRef>
+        </p:style>
+        <p:txBody>
+          <a:bodyPr rtlCol="0" anchor="ctr"/>
+          <a:lstStyle/>
+          <a:p>
+            <a:pPr algn="ctr"/>
+            <a:endParaRPr lang="en-CA"/>
+          </a:p>
+        </p:txBody>
+      </p:sp>
+      <p:sp>
+        <p:nvSpPr>
+          <p:cNvPr id="72" name="Oval 71"/>
+          <p:cNvSpPr/>
+          <p:nvPr/>
+        </p:nvSpPr>
+        <p:spPr>
+          <a:xfrm>
+            <a:off x="3078678" y="761307"/>
+            <a:ext cx="405516" cy="103034"/>
+          </a:xfrm>
+          <a:prstGeom prst="ellipse">
+            <a:avLst/>
+          </a:prstGeom>
+          <a:noFill/>
+          <a:ln w="19050">
+            <a:solidFill>
+              <a:schemeClr val="tx1"/>
+            </a:solidFill>
+          </a:ln>
+        </p:spPr>
+        <p:style>
+          <a:lnRef idx="2">
+            <a:schemeClr val="accent1">
+              <a:shade val="50000"/>
+            </a:schemeClr>
+          </a:lnRef>
+          <a:fillRef idx="1">
+            <a:schemeClr val="accent1"/>
+          </a:fillRef>
+          <a:effectRef idx="0">
+            <a:schemeClr val="accent1"/>
+          </a:effectRef>
+          <a:fontRef idx="minor">
+            <a:schemeClr val="lt1"/>
+          </a:fontRef>
+        </p:style>
+        <p:txBody>
+          <a:bodyPr rtlCol="0" anchor="ctr"/>
+          <a:lstStyle/>
+          <a:p>
+            <a:pPr algn="ctr"/>
+            <a:endParaRPr lang="en-CA"/>
+          </a:p>
+        </p:txBody>
+      </p:sp>
+      <p:sp>
+        <p:nvSpPr>
+          <p:cNvPr id="73" name="Oval 72"/>
+          <p:cNvSpPr/>
+          <p:nvPr/>
+        </p:nvSpPr>
+        <p:spPr>
+          <a:xfrm>
+            <a:off x="3724253" y="707355"/>
+            <a:ext cx="405516" cy="103034"/>
+          </a:xfrm>
+          <a:prstGeom prst="ellipse">
+            <a:avLst/>
+          </a:prstGeom>
+          <a:noFill/>
+          <a:ln w="19050">
+            <a:solidFill>
+              <a:srgbClr val="FF0000"/>
+            </a:solidFill>
+          </a:ln>
+        </p:spPr>
+        <p:style>
+          <a:lnRef idx="2">
+            <a:schemeClr val="accent1">
+              <a:shade val="50000"/>
+            </a:schemeClr>
+          </a:lnRef>
+          <a:fillRef idx="1">
+            <a:schemeClr val="accent1"/>
+          </a:fillRef>
+          <a:effectRef idx="0">
+            <a:schemeClr val="accent1"/>
+          </a:effectRef>
+          <a:fontRef idx="minor">
+            <a:schemeClr val="lt1"/>
+          </a:fontRef>
+        </p:style>
+        <p:txBody>
+          <a:bodyPr rtlCol="0" anchor="ctr"/>
+          <a:lstStyle/>
+          <a:p>
+            <a:pPr algn="ctr"/>
+            <a:endParaRPr lang="en-CA"/>
+          </a:p>
+        </p:txBody>
+      </p:sp>
+      <p:sp>
+        <p:nvSpPr>
+          <p:cNvPr id="74" name="Oval 73"/>
+          <p:cNvSpPr/>
+          <p:nvPr/>
+        </p:nvSpPr>
+        <p:spPr>
+          <a:xfrm>
+            <a:off x="3724253" y="763840"/>
+            <a:ext cx="405516" cy="103034"/>
+          </a:xfrm>
+          <a:prstGeom prst="ellipse">
+            <a:avLst/>
+          </a:prstGeom>
+          <a:noFill/>
+          <a:ln w="19050">
+            <a:solidFill>
+              <a:schemeClr val="tx1"/>
+            </a:solidFill>
+          </a:ln>
+        </p:spPr>
+        <p:style>
+          <a:lnRef idx="2">
+            <a:schemeClr val="accent1">
+              <a:shade val="50000"/>
+            </a:schemeClr>
+          </a:lnRef>
+          <a:fillRef idx="1">
+            <a:schemeClr val="accent1"/>
+          </a:fillRef>
+          <a:effectRef idx="0">
+            <a:schemeClr val="accent1"/>
+          </a:effectRef>
+          <a:fontRef idx="minor">
+            <a:schemeClr val="lt1"/>
+          </a:fontRef>
+        </p:style>
+        <p:txBody>
+          <a:bodyPr rtlCol="0" anchor="ctr"/>
+          <a:lstStyle/>
+          <a:p>
+            <a:pPr algn="ctr"/>
+            <a:endParaRPr lang="en-CA"/>
+          </a:p>
+        </p:txBody>
+      </p:sp>
+      <p:sp>
+        <p:nvSpPr>
+          <p:cNvPr id="75" name="Oval 74"/>
+          <p:cNvSpPr/>
+          <p:nvPr/>
+        </p:nvSpPr>
+        <p:spPr>
+          <a:xfrm>
+            <a:off x="4336508" y="716033"/>
+            <a:ext cx="405516" cy="103034"/>
+          </a:xfrm>
+          <a:prstGeom prst="ellipse">
+            <a:avLst/>
+          </a:prstGeom>
+          <a:noFill/>
+          <a:ln w="19050">
+            <a:solidFill>
+              <a:srgbClr val="FF0000"/>
+            </a:solidFill>
+          </a:ln>
+        </p:spPr>
+        <p:style>
+          <a:lnRef idx="2">
+            <a:schemeClr val="accent1">
+              <a:shade val="50000"/>
+            </a:schemeClr>
+          </a:lnRef>
+          <a:fillRef idx="1">
+            <a:schemeClr val="accent1"/>
+          </a:fillRef>
+          <a:effectRef idx="0">
+            <a:schemeClr val="accent1"/>
+          </a:effectRef>
+          <a:fontRef idx="minor">
+            <a:schemeClr val="lt1"/>
+          </a:fontRef>
+        </p:style>
+        <p:txBody>
+          <a:bodyPr rtlCol="0" anchor="ctr"/>
+          <a:lstStyle/>
+          <a:p>
+            <a:pPr algn="ctr"/>
+            <a:endParaRPr lang="en-CA"/>
+          </a:p>
+        </p:txBody>
+      </p:sp>
+      <p:sp>
+        <p:nvSpPr>
+          <p:cNvPr id="76" name="Oval 75"/>
+          <p:cNvSpPr/>
+          <p:nvPr/>
+        </p:nvSpPr>
+        <p:spPr>
+          <a:xfrm>
+            <a:off x="4336508" y="772518"/>
+            <a:ext cx="405516" cy="103034"/>
+          </a:xfrm>
+          <a:prstGeom prst="ellipse">
+            <a:avLst/>
+          </a:prstGeom>
+          <a:noFill/>
+          <a:ln w="19050">
+            <a:solidFill>
+              <a:schemeClr val="tx1"/>
+            </a:solidFill>
+          </a:ln>
+        </p:spPr>
+        <p:style>
+          <a:lnRef idx="2">
+            <a:schemeClr val="accent1">
+              <a:shade val="50000"/>
+            </a:schemeClr>
+          </a:lnRef>
+          <a:fillRef idx="1">
+            <a:schemeClr val="accent1"/>
+          </a:fillRef>
+          <a:effectRef idx="0">
+            <a:schemeClr val="accent1"/>
+          </a:effectRef>
+          <a:fontRef idx="minor">
+            <a:schemeClr val="lt1"/>
+          </a:fontRef>
+        </p:style>
+        <p:txBody>
+          <a:bodyPr rtlCol="0" anchor="ctr"/>
+          <a:lstStyle/>
+          <a:p>
+            <a:pPr algn="ctr"/>
+            <a:endParaRPr lang="en-CA"/>
+          </a:p>
+        </p:txBody>
+      </p:sp>
+      <p:sp>
+        <p:nvSpPr>
+          <p:cNvPr id="77" name="Oval 76"/>
+          <p:cNvSpPr/>
+          <p:nvPr/>
+        </p:nvSpPr>
+        <p:spPr>
+          <a:xfrm>
+            <a:off x="7242703" y="746021"/>
+            <a:ext cx="405516" cy="103034"/>
+          </a:xfrm>
+          <a:prstGeom prst="ellipse">
+            <a:avLst/>
+          </a:prstGeom>
+          <a:noFill/>
+          <a:ln w="19050">
+            <a:solidFill>
+              <a:srgbClr val="FF0000"/>
+            </a:solidFill>
+          </a:ln>
+        </p:spPr>
+        <p:style>
+          <a:lnRef idx="2">
+            <a:schemeClr val="accent1">
+              <a:shade val="50000"/>
+            </a:schemeClr>
+          </a:lnRef>
+          <a:fillRef idx="1">
+            <a:schemeClr val="accent1"/>
+          </a:fillRef>
+          <a:effectRef idx="0">
+            <a:schemeClr val="accent1"/>
+          </a:effectRef>
+          <a:fontRef idx="minor">
+            <a:schemeClr val="lt1"/>
+          </a:fontRef>
+        </p:style>
+        <p:txBody>
+          <a:bodyPr rtlCol="0" anchor="ctr"/>
+          <a:lstStyle/>
+          <a:p>
+            <a:pPr algn="ctr"/>
+            <a:endParaRPr lang="en-CA"/>
+          </a:p>
+        </p:txBody>
+      </p:sp>
+      <p:sp>
+        <p:nvSpPr>
+          <p:cNvPr id="79" name="Oval 78"/>
+          <p:cNvSpPr/>
+          <p:nvPr/>
+        </p:nvSpPr>
+        <p:spPr>
+          <a:xfrm>
+            <a:off x="8009079" y="750355"/>
+            <a:ext cx="405516" cy="103034"/>
+          </a:xfrm>
+          <a:prstGeom prst="ellipse">
+            <a:avLst/>
+          </a:prstGeom>
+          <a:noFill/>
+          <a:ln w="19050">
+            <a:solidFill>
+              <a:schemeClr val="tx1"/>
+            </a:solidFill>
+          </a:ln>
+        </p:spPr>
+        <p:style>
+          <a:lnRef idx="2">
+            <a:schemeClr val="accent1">
+              <a:shade val="50000"/>
+            </a:schemeClr>
+          </a:lnRef>
+          <a:fillRef idx="1">
+            <a:schemeClr val="accent1"/>
+          </a:fillRef>
+          <a:effectRef idx="0">
+            <a:schemeClr val="accent1"/>
+          </a:effectRef>
+          <a:fontRef idx="minor">
+            <a:schemeClr val="lt1"/>
+          </a:fontRef>
+        </p:style>
+        <p:txBody>
+          <a:bodyPr rtlCol="0" anchor="ctr"/>
+          <a:lstStyle/>
+          <a:p>
+            <a:pPr algn="ctr"/>
+            <a:endParaRPr lang="en-CA"/>
+          </a:p>
+        </p:txBody>
+      </p:sp>
+      <p:sp>
+        <p:nvSpPr>
+          <p:cNvPr id="81" name="Oval 80"/>
+          <p:cNvSpPr/>
+          <p:nvPr/>
+        </p:nvSpPr>
+        <p:spPr>
+          <a:xfrm rot="16200000">
+            <a:off x="9629879" y="732682"/>
+            <a:ext cx="405516" cy="103034"/>
+          </a:xfrm>
+          <a:prstGeom prst="ellipse">
+            <a:avLst/>
+          </a:prstGeom>
+          <a:noFill/>
+          <a:ln w="19050">
+            <a:solidFill>
+              <a:srgbClr val="FF0000"/>
+            </a:solidFill>
+          </a:ln>
+        </p:spPr>
+        <p:style>
+          <a:lnRef idx="2">
+            <a:schemeClr val="accent1">
+              <a:shade val="50000"/>
+            </a:schemeClr>
+          </a:lnRef>
+          <a:fillRef idx="1">
+            <a:schemeClr val="accent1"/>
+          </a:fillRef>
+          <a:effectRef idx="0">
+            <a:schemeClr val="accent1"/>
+          </a:effectRef>
+          <a:fontRef idx="minor">
+            <a:schemeClr val="lt1"/>
+          </a:fontRef>
+        </p:style>
+        <p:txBody>
+          <a:bodyPr rtlCol="0" anchor="ctr"/>
+          <a:lstStyle/>
+          <a:p>
+            <a:pPr algn="ctr"/>
+            <a:endParaRPr lang="en-CA"/>
+          </a:p>
+        </p:txBody>
+      </p:sp>
+      <p:sp>
+        <p:nvSpPr>
+          <p:cNvPr id="82" name="Oval 81"/>
+          <p:cNvSpPr/>
+          <p:nvPr/>
+        </p:nvSpPr>
+        <p:spPr>
+          <a:xfrm rot="16200000">
+            <a:off x="10239115" y="742135"/>
+            <a:ext cx="405516" cy="103034"/>
+          </a:xfrm>
+          <a:prstGeom prst="ellipse">
+            <a:avLst/>
+          </a:prstGeom>
+          <a:noFill/>
+          <a:ln w="19050">
+            <a:solidFill>
+              <a:schemeClr val="tx1"/>
+            </a:solidFill>
+          </a:ln>
+        </p:spPr>
+        <p:style>
+          <a:lnRef idx="2">
+            <a:schemeClr val="accent1">
+              <a:shade val="50000"/>
+            </a:schemeClr>
+          </a:lnRef>
+          <a:fillRef idx="1">
+            <a:schemeClr val="accent1"/>
+          </a:fillRef>
+          <a:effectRef idx="0">
+            <a:schemeClr val="accent1"/>
+          </a:effectRef>
+          <a:fontRef idx="minor">
+            <a:schemeClr val="lt1"/>
+          </a:fontRef>
+        </p:style>
+        <p:txBody>
+          <a:bodyPr rtlCol="0" anchor="ctr"/>
+          <a:lstStyle/>
+          <a:p>
+            <a:pPr algn="ctr"/>
+            <a:endParaRPr lang="en-CA"/>
+          </a:p>
+        </p:txBody>
+      </p:sp>
+    </p:spTree>
+    <p:extLst>
+      <p:ext uri="{BB962C8B-B14F-4D97-AF65-F5344CB8AC3E}">
+        <p14:creationId xmlns:p14="http://schemas.microsoft.com/office/powerpoint/2010/main" val="3823805430"/>
+      </p:ext>
+    </p:extLst>
+  </p:cSld>
+  <p:clrMapOvr>
+    <a:masterClrMapping/>
+  </p:clrMapOvr>
+</p:sld>
+</file>
+
+<file path=ppt/slides/slide3.xml><?xml version="1.0" encoding="utf-8"?>
+<p:sld xmlns:a="http://schemas.openxmlformats.org/drawingml/2006/main" xmlns:r="http://schemas.openxmlformats.org/officeDocument/2006/relationships" xmlns:p="http://schemas.openxmlformats.org/presentationml/2006/main">
+  <p:cSld>
+    <p:spTree>
+      <p:nvGrpSpPr>
+        <p:cNvPr id="1" name=""/>
+        <p:cNvGrpSpPr/>
+        <p:nvPr/>
+      </p:nvGrpSpPr>
+      <p:grpSpPr>
+        <a:xfrm>
+          <a:off x="0" y="0"/>
+          <a:ext cx="0" cy="0"/>
+          <a:chOff x="0" y="0"/>
+          <a:chExt cx="0" cy="0"/>
+        </a:xfrm>
+      </p:grpSpPr>
+      <p:sp>
+        <p:nvSpPr>
+          <p:cNvPr id="4" name="Rectangle 3"/>
+          <p:cNvSpPr/>
+          <p:nvPr/>
+        </p:nvSpPr>
+        <p:spPr>
+          <a:xfrm>
+            <a:off x="249414" y="72077"/>
+            <a:ext cx="11607040" cy="6316316"/>
+          </a:xfrm>
+          <a:prstGeom prst="rect">
+            <a:avLst/>
+          </a:prstGeom>
+          <a:solidFill>
+            <a:schemeClr val="accent1">
+              <a:lumMod val="40000"/>
+              <a:lumOff val="60000"/>
+            </a:schemeClr>
+          </a:solidFill>
+          <a:ln>
+            <a:noFill/>
+          </a:ln>
+        </p:spPr>
+        <p:style>
+          <a:lnRef idx="2">
+            <a:schemeClr val="accent1">
+              <a:shade val="50000"/>
+            </a:schemeClr>
+          </a:lnRef>
+          <a:fillRef idx="1">
+            <a:schemeClr val="accent1"/>
+          </a:fillRef>
+          <a:effectRef idx="0">
+            <a:schemeClr val="accent1"/>
+          </a:effectRef>
+          <a:fontRef idx="minor">
+            <a:schemeClr val="lt1"/>
+          </a:fontRef>
+        </p:style>
+        <p:txBody>
+          <a:bodyPr rtlCol="0" anchor="ctr"/>
+          <a:lstStyle/>
+          <a:p>
+            <a:pPr algn="ctr"/>
+            <a:endParaRPr lang="en-CA"/>
+          </a:p>
+        </p:txBody>
+      </p:sp>
+      <p:sp>
+        <p:nvSpPr>
+          <p:cNvPr id="5" name="Rectangle 4"/>
+          <p:cNvSpPr/>
+          <p:nvPr/>
+        </p:nvSpPr>
+        <p:spPr>
+          <a:xfrm>
+            <a:off x="214690" y="1049572"/>
+            <a:ext cx="11641764" cy="5732891"/>
+          </a:xfrm>
+          <a:prstGeom prst="rect">
+            <a:avLst/>
+          </a:prstGeom>
+          <a:solidFill>
+            <a:schemeClr val="bg2">
+              <a:lumMod val="90000"/>
+            </a:schemeClr>
+          </a:solidFill>
+          <a:ln>
+            <a:noFill/>
+          </a:ln>
+        </p:spPr>
+        <p:style>
+          <a:lnRef idx="2">
+            <a:schemeClr val="accent1">
+              <a:shade val="50000"/>
+            </a:schemeClr>
+          </a:lnRef>
+          <a:fillRef idx="1">
+            <a:schemeClr val="accent1"/>
+          </a:fillRef>
+          <a:effectRef idx="0">
+            <a:schemeClr val="accent1"/>
+          </a:effectRef>
+          <a:fontRef idx="minor">
+            <a:schemeClr val="lt1"/>
+          </a:fontRef>
+        </p:style>
+        <p:txBody>
+          <a:bodyPr rtlCol="0" anchor="ctr"/>
+          <a:lstStyle/>
+          <a:p>
+            <a:pPr algn="ctr"/>
+            <a:endParaRPr lang="en-CA"/>
+          </a:p>
+        </p:txBody>
+      </p:sp>
+      <p:sp>
+        <p:nvSpPr>
+          <p:cNvPr id="21" name="Rectangle 20"/>
+          <p:cNvSpPr/>
+          <p:nvPr/>
+        </p:nvSpPr>
+        <p:spPr>
+          <a:xfrm>
+            <a:off x="214679" y="1049572"/>
+            <a:ext cx="2373013" cy="677847"/>
+          </a:xfrm>
+          <a:prstGeom prst="rect">
+            <a:avLst/>
+          </a:prstGeom>
+          <a:solidFill>
+            <a:schemeClr val="bg1">
+              <a:lumMod val="65000"/>
+            </a:schemeClr>
+          </a:solidFill>
+          <a:ln>
+            <a:noFill/>
+          </a:ln>
+        </p:spPr>
+        <p:style>
+          <a:lnRef idx="2">
+            <a:schemeClr val="accent1">
+              <a:shade val="50000"/>
+            </a:schemeClr>
+          </a:lnRef>
+          <a:fillRef idx="1">
+            <a:schemeClr val="accent1"/>
+          </a:fillRef>
+          <a:effectRef idx="0">
+            <a:schemeClr val="accent1"/>
+          </a:effectRef>
+          <a:fontRef idx="minor">
+            <a:schemeClr val="lt1"/>
+          </a:fontRef>
+        </p:style>
+        <p:txBody>
+          <a:bodyPr rtlCol="0" anchor="ctr"/>
+          <a:lstStyle/>
+          <a:p>
+            <a:pPr algn="ctr"/>
+            <a:endParaRPr lang="en-CA"/>
+          </a:p>
+        </p:txBody>
+      </p:sp>
+      <p:sp>
+        <p:nvSpPr>
+          <p:cNvPr id="58" name="TextBox 57"/>
+          <p:cNvSpPr txBox="1"/>
+          <p:nvPr/>
+        </p:nvSpPr>
+        <p:spPr>
+          <a:xfrm>
+            <a:off x="249413" y="94927"/>
+            <a:ext cx="1046260" cy="307777"/>
+          </a:xfrm>
+          <a:prstGeom prst="rect">
+            <a:avLst/>
+          </a:prstGeom>
+          <a:noFill/>
+        </p:spPr>
+        <p:txBody>
+          <a:bodyPr wrap="square" rtlCol="0">
+            <a:spAutoFit/>
+          </a:bodyPr>
+          <a:lstStyle/>
+          <a:p>
+            <a:r>
+              <a:rPr lang="en-CA" sz="1400" b="1" dirty="0" smtClean="0"/>
+              <a:t>Sounding </a:t>
+            </a:r>
+            <a:r>
+              <a:rPr lang="en-CA" sz="1400" b="1" dirty="0" smtClean="0"/>
+              <a:t>1</a:t>
+            </a:r>
+            <a:endParaRPr lang="en-CA" sz="1400" b="1" dirty="0"/>
+          </a:p>
+        </p:txBody>
+      </p:sp>
+      <p:sp>
+        <p:nvSpPr>
+          <p:cNvPr id="59" name="TextBox 58"/>
+          <p:cNvSpPr txBox="1"/>
+          <p:nvPr/>
+        </p:nvSpPr>
+        <p:spPr>
+          <a:xfrm>
+            <a:off x="2587692" y="94927"/>
+            <a:ext cx="1046518" cy="307777"/>
+          </a:xfrm>
+          <a:prstGeom prst="rect">
+            <a:avLst/>
+          </a:prstGeom>
+          <a:noFill/>
+        </p:spPr>
+        <p:txBody>
+          <a:bodyPr wrap="square" rtlCol="0">
+            <a:spAutoFit/>
+          </a:bodyPr>
+          <a:lstStyle/>
+          <a:p>
+            <a:r>
+              <a:rPr lang="en-CA" sz="1400" b="1" dirty="0" smtClean="0"/>
+              <a:t>Sounding </a:t>
+            </a:r>
+            <a:r>
+              <a:rPr lang="en-CA" sz="1400" b="1" dirty="0" smtClean="0"/>
+              <a:t>2</a:t>
+            </a:r>
+            <a:endParaRPr lang="en-CA" sz="1400" b="1" dirty="0"/>
+          </a:p>
+        </p:txBody>
+      </p:sp>
+      <p:sp>
+        <p:nvSpPr>
+          <p:cNvPr id="77" name="Oval 76"/>
+          <p:cNvSpPr/>
+          <p:nvPr/>
+        </p:nvSpPr>
+        <p:spPr>
+          <a:xfrm>
+            <a:off x="802150" y="738725"/>
+            <a:ext cx="405516" cy="103034"/>
+          </a:xfrm>
+          <a:prstGeom prst="ellipse">
+            <a:avLst/>
+          </a:prstGeom>
+          <a:noFill/>
+          <a:ln w="19050">
+            <a:solidFill>
+              <a:srgbClr val="FF0000"/>
+            </a:solidFill>
+          </a:ln>
+        </p:spPr>
+        <p:style>
+          <a:lnRef idx="2">
+            <a:schemeClr val="accent1">
+              <a:shade val="50000"/>
+            </a:schemeClr>
+          </a:lnRef>
+          <a:fillRef idx="1">
+            <a:schemeClr val="accent1"/>
+          </a:fillRef>
+          <a:effectRef idx="0">
+            <a:schemeClr val="accent1"/>
+          </a:effectRef>
+          <a:fontRef idx="minor">
+            <a:schemeClr val="lt1"/>
+          </a:fontRef>
+        </p:style>
+        <p:txBody>
+          <a:bodyPr rtlCol="0" anchor="ctr"/>
+          <a:lstStyle/>
+          <a:p>
+            <a:pPr algn="ctr"/>
+            <a:endParaRPr lang="en-CA"/>
+          </a:p>
+        </p:txBody>
+      </p:sp>
+      <p:sp>
+        <p:nvSpPr>
+          <p:cNvPr id="79" name="Oval 78"/>
+          <p:cNvSpPr/>
+          <p:nvPr/>
+        </p:nvSpPr>
+        <p:spPr>
+          <a:xfrm>
+            <a:off x="1568526" y="743059"/>
+            <a:ext cx="405516" cy="103034"/>
+          </a:xfrm>
+          <a:prstGeom prst="ellipse">
+            <a:avLst/>
+          </a:prstGeom>
+          <a:noFill/>
+          <a:ln w="19050">
+            <a:solidFill>
+              <a:schemeClr val="tx1"/>
+            </a:solidFill>
+          </a:ln>
+        </p:spPr>
+        <p:style>
+          <a:lnRef idx="2">
+            <a:schemeClr val="accent1">
+              <a:shade val="50000"/>
+            </a:schemeClr>
+          </a:lnRef>
+          <a:fillRef idx="1">
+            <a:schemeClr val="accent1"/>
+          </a:fillRef>
+          <a:effectRef idx="0">
+            <a:schemeClr val="accent1"/>
+          </a:effectRef>
+          <a:fontRef idx="minor">
+            <a:schemeClr val="lt1"/>
+          </a:fontRef>
+        </p:style>
+        <p:txBody>
+          <a:bodyPr rtlCol="0" anchor="ctr"/>
+          <a:lstStyle/>
+          <a:p>
+            <a:pPr algn="ctr"/>
+            <a:endParaRPr lang="en-CA"/>
+          </a:p>
+        </p:txBody>
+      </p:sp>
+      <p:sp>
+        <p:nvSpPr>
+          <p:cNvPr id="62" name="Rectangle 61"/>
+          <p:cNvSpPr/>
+          <p:nvPr/>
+        </p:nvSpPr>
+        <p:spPr>
+          <a:xfrm>
+            <a:off x="2565363" y="1063338"/>
+            <a:ext cx="2328355" cy="911897"/>
+          </a:xfrm>
+          <a:prstGeom prst="rect">
+            <a:avLst/>
+          </a:prstGeom>
+          <a:solidFill>
+            <a:schemeClr val="bg1">
+              <a:lumMod val="65000"/>
+            </a:schemeClr>
+          </a:solidFill>
+          <a:ln>
+            <a:noFill/>
+          </a:ln>
+        </p:spPr>
+        <p:style>
+          <a:lnRef idx="2">
+            <a:schemeClr val="accent1">
+              <a:shade val="50000"/>
+            </a:schemeClr>
+          </a:lnRef>
+          <a:fillRef idx="1">
+            <a:schemeClr val="accent1"/>
+          </a:fillRef>
+          <a:effectRef idx="0">
+            <a:schemeClr val="accent1"/>
+          </a:effectRef>
+          <a:fontRef idx="minor">
+            <a:schemeClr val="lt1"/>
+          </a:fontRef>
+        </p:style>
+        <p:txBody>
+          <a:bodyPr rtlCol="0" anchor="ctr"/>
+          <a:lstStyle/>
+          <a:p>
+            <a:pPr algn="ctr"/>
+            <a:endParaRPr lang="en-CA"/>
+          </a:p>
+        </p:txBody>
+      </p:sp>
+      <p:sp>
+        <p:nvSpPr>
+          <p:cNvPr id="63" name="Rectangle 62"/>
+          <p:cNvSpPr/>
+          <p:nvPr/>
+        </p:nvSpPr>
+        <p:spPr>
+          <a:xfrm>
+            <a:off x="4893718" y="1073249"/>
+            <a:ext cx="2310165" cy="1182271"/>
+          </a:xfrm>
+          <a:prstGeom prst="rect">
+            <a:avLst/>
+          </a:prstGeom>
+          <a:solidFill>
+            <a:schemeClr val="bg1">
+              <a:lumMod val="65000"/>
+            </a:schemeClr>
+          </a:solidFill>
+          <a:ln>
+            <a:noFill/>
+          </a:ln>
+        </p:spPr>
+        <p:style>
+          <a:lnRef idx="2">
+            <a:schemeClr val="accent1">
+              <a:shade val="50000"/>
+            </a:schemeClr>
+          </a:lnRef>
+          <a:fillRef idx="1">
+            <a:schemeClr val="accent1"/>
+          </a:fillRef>
+          <a:effectRef idx="0">
+            <a:schemeClr val="accent1"/>
+          </a:effectRef>
+          <a:fontRef idx="minor">
+            <a:schemeClr val="lt1"/>
+          </a:fontRef>
+        </p:style>
+        <p:txBody>
+          <a:bodyPr rtlCol="0" anchor="ctr"/>
+          <a:lstStyle/>
+          <a:p>
+            <a:pPr algn="ctr"/>
+            <a:endParaRPr lang="en-CA"/>
+          </a:p>
+        </p:txBody>
+      </p:sp>
+      <p:sp>
+        <p:nvSpPr>
+          <p:cNvPr id="64" name="Rectangle 63"/>
+          <p:cNvSpPr/>
+          <p:nvPr/>
+        </p:nvSpPr>
+        <p:spPr>
+          <a:xfrm>
+            <a:off x="7199744" y="1076408"/>
+            <a:ext cx="2328355" cy="1489876"/>
+          </a:xfrm>
+          <a:prstGeom prst="rect">
+            <a:avLst/>
+          </a:prstGeom>
+          <a:solidFill>
+            <a:schemeClr val="bg1">
+              <a:lumMod val="65000"/>
+            </a:schemeClr>
+          </a:solidFill>
+          <a:ln>
+            <a:noFill/>
+          </a:ln>
+        </p:spPr>
+        <p:style>
+          <a:lnRef idx="2">
+            <a:schemeClr val="accent1">
+              <a:shade val="50000"/>
+            </a:schemeClr>
+          </a:lnRef>
+          <a:fillRef idx="1">
+            <a:schemeClr val="accent1"/>
+          </a:fillRef>
+          <a:effectRef idx="0">
+            <a:schemeClr val="accent1"/>
+          </a:effectRef>
+          <a:fontRef idx="minor">
+            <a:schemeClr val="lt1"/>
+          </a:fontRef>
+        </p:style>
+        <p:txBody>
+          <a:bodyPr rtlCol="0" anchor="ctr"/>
+          <a:lstStyle/>
+          <a:p>
+            <a:pPr algn="ctr"/>
+            <a:endParaRPr lang="en-CA"/>
+          </a:p>
+        </p:txBody>
+      </p:sp>
+      <p:sp>
+        <p:nvSpPr>
+          <p:cNvPr id="65" name="Rectangle 64"/>
+          <p:cNvSpPr/>
+          <p:nvPr/>
+        </p:nvSpPr>
+        <p:spPr>
+          <a:xfrm>
+            <a:off x="9528099" y="1073249"/>
+            <a:ext cx="2328355" cy="1807109"/>
+          </a:xfrm>
+          <a:prstGeom prst="rect">
+            <a:avLst/>
+          </a:prstGeom>
+          <a:solidFill>
+            <a:schemeClr val="bg1">
+              <a:lumMod val="65000"/>
+            </a:schemeClr>
+          </a:solidFill>
+          <a:ln>
+            <a:noFill/>
+          </a:ln>
+        </p:spPr>
+        <p:style>
+          <a:lnRef idx="2">
+            <a:schemeClr val="accent1">
+              <a:shade val="50000"/>
+            </a:schemeClr>
+          </a:lnRef>
+          <a:fillRef idx="1">
+            <a:schemeClr val="accent1"/>
+          </a:fillRef>
+          <a:effectRef idx="0">
+            <a:schemeClr val="accent1"/>
+          </a:effectRef>
+          <a:fontRef idx="minor">
+            <a:schemeClr val="lt1"/>
+          </a:fontRef>
+        </p:style>
+        <p:txBody>
+          <a:bodyPr rtlCol="0" anchor="ctr"/>
+          <a:lstStyle/>
+          <a:p>
+            <a:pPr algn="ctr"/>
+            <a:endParaRPr lang="en-CA"/>
+          </a:p>
+        </p:txBody>
+      </p:sp>
+      <p:cxnSp>
+        <p:nvCxnSpPr>
+          <p:cNvPr id="80" name="Straight Connector 79"/>
+          <p:cNvCxnSpPr/>
+          <p:nvPr/>
+        </p:nvCxnSpPr>
+        <p:spPr>
+          <a:xfrm flipV="1">
+            <a:off x="214680" y="1248355"/>
+            <a:ext cx="11641774" cy="13252"/>
+          </a:xfrm>
+          <a:prstGeom prst="line">
+            <a:avLst/>
+          </a:prstGeom>
+          <a:ln w="19050"/>
+        </p:spPr>
+        <p:style>
+          <a:lnRef idx="1">
+            <a:schemeClr val="dk1"/>
+          </a:lnRef>
+          <a:fillRef idx="0">
+            <a:schemeClr val="dk1"/>
+          </a:fillRef>
+          <a:effectRef idx="0">
+            <a:schemeClr val="dk1"/>
+          </a:effectRef>
+          <a:fontRef idx="minor">
+            <a:schemeClr val="tx1"/>
+          </a:fontRef>
+        </p:style>
+      </p:cxnSp>
+      <p:cxnSp>
+        <p:nvCxnSpPr>
+          <p:cNvPr id="83" name="Straight Connector 82"/>
+          <p:cNvCxnSpPr/>
+          <p:nvPr/>
+        </p:nvCxnSpPr>
+        <p:spPr>
+          <a:xfrm flipV="1">
+            <a:off x="214680" y="1486894"/>
+            <a:ext cx="11641774" cy="5302"/>
+          </a:xfrm>
+          <a:prstGeom prst="line">
+            <a:avLst/>
+          </a:prstGeom>
+          <a:ln w="19050"/>
+        </p:spPr>
+        <p:style>
+          <a:lnRef idx="1">
+            <a:schemeClr val="dk1"/>
+          </a:lnRef>
+          <a:fillRef idx="0">
+            <a:schemeClr val="dk1"/>
+          </a:fillRef>
+          <a:effectRef idx="0">
+            <a:schemeClr val="dk1"/>
+          </a:effectRef>
+          <a:fontRef idx="minor">
+            <a:schemeClr val="tx1"/>
+          </a:fontRef>
+        </p:style>
+      </p:cxnSp>
+      <p:cxnSp>
+        <p:nvCxnSpPr>
+          <p:cNvPr id="84" name="Straight Connector 83"/>
+          <p:cNvCxnSpPr/>
+          <p:nvPr/>
+        </p:nvCxnSpPr>
+        <p:spPr>
+          <a:xfrm>
+            <a:off x="214682" y="1045597"/>
+            <a:ext cx="11641772" cy="3975"/>
+          </a:xfrm>
+          <a:prstGeom prst="line">
+            <a:avLst/>
+          </a:prstGeom>
+          <a:ln w="28575"/>
+        </p:spPr>
+        <p:style>
+          <a:lnRef idx="1">
+            <a:schemeClr val="dk1"/>
+          </a:lnRef>
+          <a:fillRef idx="0">
+            <a:schemeClr val="dk1"/>
+          </a:fillRef>
+          <a:effectRef idx="0">
+            <a:schemeClr val="dk1"/>
+          </a:effectRef>
+          <a:fontRef idx="minor">
+            <a:schemeClr val="tx1"/>
+          </a:fontRef>
+        </p:style>
+      </p:cxnSp>
+      <p:sp>
+        <p:nvSpPr>
+          <p:cNvPr id="85" name="Rectangle 84"/>
+          <p:cNvSpPr/>
+          <p:nvPr/>
+        </p:nvSpPr>
+        <p:spPr>
+          <a:xfrm>
+            <a:off x="214684" y="71562"/>
+            <a:ext cx="11641770" cy="6693999"/>
+          </a:xfrm>
+          <a:prstGeom prst="rect">
+            <a:avLst/>
+          </a:prstGeom>
+          <a:noFill/>
+          <a:ln w="38100">
+            <a:solidFill>
+              <a:schemeClr val="tx1"/>
+            </a:solidFill>
+          </a:ln>
+        </p:spPr>
+        <p:style>
+          <a:lnRef idx="2">
+            <a:schemeClr val="accent1">
+              <a:shade val="50000"/>
+            </a:schemeClr>
+          </a:lnRef>
+          <a:fillRef idx="1">
+            <a:schemeClr val="accent1"/>
+          </a:fillRef>
+          <a:effectRef idx="0">
+            <a:schemeClr val="accent1"/>
+          </a:effectRef>
+          <a:fontRef idx="minor">
+            <a:schemeClr val="lt1"/>
+          </a:fontRef>
+        </p:style>
+        <p:txBody>
+          <a:bodyPr rtlCol="0" anchor="ctr"/>
+          <a:lstStyle/>
+          <a:p>
+            <a:pPr algn="ctr"/>
+            <a:endParaRPr lang="en-CA"/>
+          </a:p>
+        </p:txBody>
+      </p:sp>
+      <p:cxnSp>
+        <p:nvCxnSpPr>
+          <p:cNvPr id="86" name="Straight Connector 85"/>
+          <p:cNvCxnSpPr/>
+          <p:nvPr/>
+        </p:nvCxnSpPr>
+        <p:spPr>
+          <a:xfrm flipV="1">
+            <a:off x="214680" y="1727419"/>
+            <a:ext cx="11641774" cy="9939"/>
+          </a:xfrm>
+          <a:prstGeom prst="line">
+            <a:avLst/>
+          </a:prstGeom>
+          <a:ln w="19050"/>
+        </p:spPr>
+        <p:style>
+          <a:lnRef idx="1">
+            <a:schemeClr val="dk1"/>
+          </a:lnRef>
+          <a:fillRef idx="0">
+            <a:schemeClr val="dk1"/>
+          </a:fillRef>
+          <a:effectRef idx="0">
+            <a:schemeClr val="dk1"/>
+          </a:effectRef>
+          <a:fontRef idx="minor">
+            <a:schemeClr val="tx1"/>
+          </a:fontRef>
+        </p:style>
+      </p:cxnSp>
+      <p:cxnSp>
+        <p:nvCxnSpPr>
+          <p:cNvPr id="87" name="Straight Connector 86"/>
+          <p:cNvCxnSpPr/>
+          <p:nvPr/>
+        </p:nvCxnSpPr>
+        <p:spPr>
+          <a:xfrm flipV="1">
+            <a:off x="214680" y="2874222"/>
+            <a:ext cx="11641774" cy="9939"/>
+          </a:xfrm>
+          <a:prstGeom prst="line">
+            <a:avLst/>
+          </a:prstGeom>
+          <a:ln w="19050"/>
+        </p:spPr>
+        <p:style>
+          <a:lnRef idx="1">
+            <a:schemeClr val="dk1"/>
+          </a:lnRef>
+          <a:fillRef idx="0">
+            <a:schemeClr val="dk1"/>
+          </a:fillRef>
+          <a:effectRef idx="0">
+            <a:schemeClr val="dk1"/>
+          </a:effectRef>
+          <a:fontRef idx="minor">
+            <a:schemeClr val="tx1"/>
+          </a:fontRef>
+        </p:style>
+      </p:cxnSp>
+      <p:cxnSp>
+        <p:nvCxnSpPr>
+          <p:cNvPr id="88" name="Straight Connector 87"/>
+          <p:cNvCxnSpPr/>
+          <p:nvPr/>
+        </p:nvCxnSpPr>
+        <p:spPr>
+          <a:xfrm flipV="1">
+            <a:off x="227913" y="2245581"/>
+            <a:ext cx="11641774" cy="9939"/>
+          </a:xfrm>
+          <a:prstGeom prst="line">
+            <a:avLst/>
+          </a:prstGeom>
+          <a:ln w="19050"/>
+        </p:spPr>
+        <p:style>
+          <a:lnRef idx="1">
+            <a:schemeClr val="dk1"/>
+          </a:lnRef>
+          <a:fillRef idx="0">
+            <a:schemeClr val="dk1"/>
+          </a:fillRef>
+          <a:effectRef idx="0">
+            <a:schemeClr val="dk1"/>
+          </a:effectRef>
+          <a:fontRef idx="minor">
+            <a:schemeClr val="tx1"/>
+          </a:fontRef>
+        </p:style>
+      </p:cxnSp>
+      <p:cxnSp>
+        <p:nvCxnSpPr>
+          <p:cNvPr id="89" name="Straight Connector 88"/>
+          <p:cNvCxnSpPr/>
+          <p:nvPr/>
+        </p:nvCxnSpPr>
+        <p:spPr>
+          <a:xfrm flipV="1">
+            <a:off x="227913" y="2570579"/>
+            <a:ext cx="11641774" cy="9939"/>
+          </a:xfrm>
+          <a:prstGeom prst="line">
+            <a:avLst/>
+          </a:prstGeom>
+          <a:ln w="19050"/>
+        </p:spPr>
+        <p:style>
+          <a:lnRef idx="1">
+            <a:schemeClr val="dk1"/>
+          </a:lnRef>
+          <a:fillRef idx="0">
+            <a:schemeClr val="dk1"/>
+          </a:fillRef>
+          <a:effectRef idx="0">
+            <a:schemeClr val="dk1"/>
+          </a:effectRef>
+          <a:fontRef idx="minor">
+            <a:schemeClr val="tx1"/>
+          </a:fontRef>
+        </p:style>
+      </p:cxnSp>
+      <p:cxnSp>
+        <p:nvCxnSpPr>
+          <p:cNvPr id="90" name="Straight Connector 89"/>
+          <p:cNvCxnSpPr/>
+          <p:nvPr/>
+        </p:nvCxnSpPr>
+        <p:spPr>
+          <a:xfrm flipV="1">
+            <a:off x="227913" y="3740081"/>
+            <a:ext cx="11641774" cy="9939"/>
+          </a:xfrm>
+          <a:prstGeom prst="line">
+            <a:avLst/>
+          </a:prstGeom>
+          <a:ln w="19050"/>
+        </p:spPr>
+        <p:style>
+          <a:lnRef idx="1">
+            <a:schemeClr val="dk1"/>
+          </a:lnRef>
+          <a:fillRef idx="0">
+            <a:schemeClr val="dk1"/>
+          </a:fillRef>
+          <a:effectRef idx="0">
+            <a:schemeClr val="dk1"/>
+          </a:effectRef>
+          <a:fontRef idx="minor">
+            <a:schemeClr val="tx1"/>
+          </a:fontRef>
+        </p:style>
+      </p:cxnSp>
+      <p:cxnSp>
+        <p:nvCxnSpPr>
+          <p:cNvPr id="91" name="Straight Connector 90"/>
+          <p:cNvCxnSpPr/>
+          <p:nvPr/>
+        </p:nvCxnSpPr>
+        <p:spPr>
+          <a:xfrm flipV="1">
+            <a:off x="214680" y="3239342"/>
+            <a:ext cx="11641774" cy="9939"/>
+          </a:xfrm>
+          <a:prstGeom prst="line">
+            <a:avLst/>
+          </a:prstGeom>
+          <a:ln w="19050"/>
+        </p:spPr>
+        <p:style>
+          <a:lnRef idx="1">
+            <a:schemeClr val="dk1"/>
+          </a:lnRef>
+          <a:fillRef idx="0">
+            <a:schemeClr val="dk1"/>
+          </a:fillRef>
+          <a:effectRef idx="0">
+            <a:schemeClr val="dk1"/>
+          </a:effectRef>
+          <a:fontRef idx="minor">
+            <a:schemeClr val="tx1"/>
+          </a:fontRef>
+        </p:style>
+      </p:cxnSp>
+      <p:cxnSp>
+        <p:nvCxnSpPr>
+          <p:cNvPr id="92" name="Straight Connector 91"/>
+          <p:cNvCxnSpPr/>
+          <p:nvPr/>
+        </p:nvCxnSpPr>
+        <p:spPr>
+          <a:xfrm flipV="1">
+            <a:off x="236181" y="1975207"/>
+            <a:ext cx="11641774" cy="9939"/>
+          </a:xfrm>
+          <a:prstGeom prst="line">
+            <a:avLst/>
+          </a:prstGeom>
+          <a:ln w="19050"/>
+        </p:spPr>
+        <p:style>
+          <a:lnRef idx="1">
+            <a:schemeClr val="dk1"/>
+          </a:lnRef>
+          <a:fillRef idx="0">
+            <a:schemeClr val="dk1"/>
+          </a:fillRef>
+          <a:effectRef idx="0">
+            <a:schemeClr val="dk1"/>
+          </a:effectRef>
+          <a:fontRef idx="minor">
+            <a:schemeClr val="tx1"/>
+          </a:fontRef>
+        </p:style>
+      </p:cxnSp>
+      <p:cxnSp>
+        <p:nvCxnSpPr>
+          <p:cNvPr id="93" name="Straight Connector 92"/>
+          <p:cNvCxnSpPr/>
+          <p:nvPr/>
+        </p:nvCxnSpPr>
+        <p:spPr>
+          <a:xfrm flipV="1">
+            <a:off x="201451" y="4327905"/>
+            <a:ext cx="11641774" cy="9939"/>
+          </a:xfrm>
+          <a:prstGeom prst="line">
+            <a:avLst/>
+          </a:prstGeom>
+          <a:ln w="19050"/>
+        </p:spPr>
+        <p:style>
+          <a:lnRef idx="1">
+            <a:schemeClr val="dk1"/>
+          </a:lnRef>
+          <a:fillRef idx="0">
+            <a:schemeClr val="dk1"/>
+          </a:fillRef>
+          <a:effectRef idx="0">
+            <a:schemeClr val="dk1"/>
+          </a:effectRef>
+          <a:fontRef idx="minor">
+            <a:schemeClr val="tx1"/>
+          </a:fontRef>
+        </p:style>
+      </p:cxnSp>
+      <p:cxnSp>
+        <p:nvCxnSpPr>
+          <p:cNvPr id="94" name="Straight Connector 93"/>
+          <p:cNvCxnSpPr/>
+          <p:nvPr/>
+        </p:nvCxnSpPr>
+        <p:spPr>
+          <a:xfrm flipV="1">
+            <a:off x="227913" y="5059267"/>
+            <a:ext cx="11641774" cy="9939"/>
+          </a:xfrm>
+          <a:prstGeom prst="line">
+            <a:avLst/>
+          </a:prstGeom>
+          <a:ln w="19050"/>
+        </p:spPr>
+        <p:style>
+          <a:lnRef idx="1">
+            <a:schemeClr val="dk1"/>
+          </a:lnRef>
+          <a:fillRef idx="0">
+            <a:schemeClr val="dk1"/>
+          </a:fillRef>
+          <a:effectRef idx="0">
+            <a:schemeClr val="dk1"/>
+          </a:effectRef>
+          <a:fontRef idx="minor">
+            <a:schemeClr val="tx1"/>
+          </a:fontRef>
+        </p:style>
+      </p:cxnSp>
+      <p:cxnSp>
+        <p:nvCxnSpPr>
+          <p:cNvPr id="95" name="Straight Connector 94"/>
+          <p:cNvCxnSpPr/>
+          <p:nvPr/>
+        </p:nvCxnSpPr>
+        <p:spPr>
+          <a:xfrm>
+            <a:off x="2543034" y="88464"/>
+            <a:ext cx="44658" cy="6693999"/>
+          </a:xfrm>
+          <a:prstGeom prst="line">
+            <a:avLst/>
+          </a:prstGeom>
+          <a:ln w="38100">
+            <a:prstDash val="sysDash"/>
+          </a:ln>
+        </p:spPr>
+        <p:style>
+          <a:lnRef idx="1">
+            <a:schemeClr val="dk1"/>
+          </a:lnRef>
+          <a:fillRef idx="0">
+            <a:schemeClr val="dk1"/>
+          </a:fillRef>
+          <a:effectRef idx="0">
+            <a:schemeClr val="dk1"/>
+          </a:effectRef>
+          <a:fontRef idx="minor">
+            <a:schemeClr val="tx1"/>
+          </a:fontRef>
+        </p:style>
+      </p:cxnSp>
+      <p:cxnSp>
+        <p:nvCxnSpPr>
+          <p:cNvPr id="96" name="Straight Connector 95"/>
+          <p:cNvCxnSpPr/>
+          <p:nvPr/>
+        </p:nvCxnSpPr>
+        <p:spPr>
+          <a:xfrm>
+            <a:off x="4862283" y="88464"/>
+            <a:ext cx="44658" cy="6693999"/>
+          </a:xfrm>
+          <a:prstGeom prst="line">
+            <a:avLst/>
+          </a:prstGeom>
+          <a:ln w="38100">
+            <a:prstDash val="sysDash"/>
+          </a:ln>
+        </p:spPr>
+        <p:style>
+          <a:lnRef idx="1">
+            <a:schemeClr val="dk1"/>
+          </a:lnRef>
+          <a:fillRef idx="0">
+            <a:schemeClr val="dk1"/>
+          </a:fillRef>
+          <a:effectRef idx="0">
+            <a:schemeClr val="dk1"/>
+          </a:effectRef>
+          <a:fontRef idx="minor">
+            <a:schemeClr val="tx1"/>
+          </a:fontRef>
+        </p:style>
+      </p:cxnSp>
+      <p:cxnSp>
+        <p:nvCxnSpPr>
+          <p:cNvPr id="97" name="Straight Connector 96"/>
+          <p:cNvCxnSpPr/>
+          <p:nvPr/>
+        </p:nvCxnSpPr>
+        <p:spPr>
+          <a:xfrm>
+            <a:off x="7164182" y="54660"/>
+            <a:ext cx="44658" cy="6693999"/>
+          </a:xfrm>
+          <a:prstGeom prst="line">
+            <a:avLst/>
+          </a:prstGeom>
+          <a:ln w="38100">
+            <a:prstDash val="sysDash"/>
+          </a:ln>
+        </p:spPr>
+        <p:style>
+          <a:lnRef idx="1">
+            <a:schemeClr val="dk1"/>
+          </a:lnRef>
+          <a:fillRef idx="0">
+            <a:schemeClr val="dk1"/>
+          </a:fillRef>
+          <a:effectRef idx="0">
+            <a:schemeClr val="dk1"/>
+          </a:effectRef>
+          <a:fontRef idx="minor">
+            <a:schemeClr val="tx1"/>
+          </a:fontRef>
+        </p:style>
+      </p:cxnSp>
+      <p:cxnSp>
+        <p:nvCxnSpPr>
+          <p:cNvPr id="98" name="Straight Connector 97"/>
+          <p:cNvCxnSpPr/>
+          <p:nvPr/>
+        </p:nvCxnSpPr>
+        <p:spPr>
+          <a:xfrm>
+            <a:off x="9492717" y="81827"/>
+            <a:ext cx="44658" cy="6693999"/>
+          </a:xfrm>
+          <a:prstGeom prst="line">
+            <a:avLst/>
+          </a:prstGeom>
+          <a:ln w="38100">
+            <a:prstDash val="sysDash"/>
+          </a:ln>
+        </p:spPr>
+        <p:style>
+          <a:lnRef idx="1">
+            <a:schemeClr val="dk1"/>
+          </a:lnRef>
+          <a:fillRef idx="0">
+            <a:schemeClr val="dk1"/>
+          </a:fillRef>
+          <a:effectRef idx="0">
+            <a:schemeClr val="dk1"/>
+          </a:effectRef>
+          <a:fontRef idx="minor">
+            <a:schemeClr val="tx1"/>
+          </a:fontRef>
+        </p:style>
+      </p:cxnSp>
+      <p:sp>
+        <p:nvSpPr>
+          <p:cNvPr id="99" name="Oval 98"/>
+          <p:cNvSpPr/>
+          <p:nvPr/>
+        </p:nvSpPr>
+        <p:spPr>
+          <a:xfrm>
+            <a:off x="3059391" y="746002"/>
+            <a:ext cx="405516" cy="103034"/>
+          </a:xfrm>
+          <a:prstGeom prst="ellipse">
+            <a:avLst/>
+          </a:prstGeom>
+          <a:noFill/>
+          <a:ln w="19050">
+            <a:solidFill>
+              <a:srgbClr val="FF0000"/>
+            </a:solidFill>
+          </a:ln>
+        </p:spPr>
+        <p:style>
+          <a:lnRef idx="2">
+            <a:schemeClr val="accent1">
+              <a:shade val="50000"/>
+            </a:schemeClr>
+          </a:lnRef>
+          <a:fillRef idx="1">
+            <a:schemeClr val="accent1"/>
+          </a:fillRef>
+          <a:effectRef idx="0">
+            <a:schemeClr val="accent1"/>
+          </a:effectRef>
+          <a:fontRef idx="minor">
+            <a:schemeClr val="lt1"/>
+          </a:fontRef>
+        </p:style>
+        <p:txBody>
+          <a:bodyPr rtlCol="0" anchor="ctr"/>
+          <a:lstStyle/>
+          <a:p>
+            <a:pPr algn="ctr"/>
+            <a:endParaRPr lang="en-CA"/>
+          </a:p>
+        </p:txBody>
+      </p:sp>
+      <p:sp>
+        <p:nvSpPr>
+          <p:cNvPr id="100" name="Oval 99"/>
+          <p:cNvSpPr/>
+          <p:nvPr/>
+        </p:nvSpPr>
+        <p:spPr>
+          <a:xfrm>
+            <a:off x="3825767" y="750336"/>
+            <a:ext cx="405516" cy="103034"/>
+          </a:xfrm>
+          <a:prstGeom prst="ellipse">
+            <a:avLst/>
+          </a:prstGeom>
+          <a:noFill/>
+          <a:ln w="19050">
+            <a:solidFill>
+              <a:schemeClr val="tx1"/>
+            </a:solidFill>
+          </a:ln>
+        </p:spPr>
+        <p:style>
+          <a:lnRef idx="2">
+            <a:schemeClr val="accent1">
+              <a:shade val="50000"/>
+            </a:schemeClr>
+          </a:lnRef>
+          <a:fillRef idx="1">
+            <a:schemeClr val="accent1"/>
+          </a:fillRef>
+          <a:effectRef idx="0">
+            <a:schemeClr val="accent1"/>
+          </a:effectRef>
+          <a:fontRef idx="minor">
+            <a:schemeClr val="lt1"/>
+          </a:fontRef>
+        </p:style>
+        <p:txBody>
+          <a:bodyPr rtlCol="0" anchor="ctr"/>
+          <a:lstStyle/>
+          <a:p>
+            <a:pPr algn="ctr"/>
+            <a:endParaRPr lang="en-CA"/>
+          </a:p>
+        </p:txBody>
+      </p:sp>
+      <p:sp>
+        <p:nvSpPr>
+          <p:cNvPr id="101" name="Oval 100"/>
+          <p:cNvSpPr/>
+          <p:nvPr/>
+        </p:nvSpPr>
+        <p:spPr>
+          <a:xfrm>
+            <a:off x="5387926" y="762837"/>
+            <a:ext cx="405516" cy="103034"/>
+          </a:xfrm>
+          <a:prstGeom prst="ellipse">
+            <a:avLst/>
+          </a:prstGeom>
+          <a:noFill/>
+          <a:ln w="19050">
+            <a:solidFill>
+              <a:srgbClr val="FF0000"/>
+            </a:solidFill>
+          </a:ln>
+        </p:spPr>
+        <p:style>
+          <a:lnRef idx="2">
+            <a:schemeClr val="accent1">
+              <a:shade val="50000"/>
+            </a:schemeClr>
+          </a:lnRef>
+          <a:fillRef idx="1">
+            <a:schemeClr val="accent1"/>
+          </a:fillRef>
+          <a:effectRef idx="0">
+            <a:schemeClr val="accent1"/>
+          </a:effectRef>
+          <a:fontRef idx="minor">
+            <a:schemeClr val="lt1"/>
+          </a:fontRef>
+        </p:style>
+        <p:txBody>
+          <a:bodyPr rtlCol="0" anchor="ctr"/>
+          <a:lstStyle/>
+          <a:p>
+            <a:pPr algn="ctr"/>
+            <a:endParaRPr lang="en-CA"/>
+          </a:p>
+        </p:txBody>
+      </p:sp>
+      <p:sp>
+        <p:nvSpPr>
+          <p:cNvPr id="102" name="Oval 101"/>
+          <p:cNvSpPr/>
+          <p:nvPr/>
+        </p:nvSpPr>
+        <p:spPr>
+          <a:xfrm>
+            <a:off x="6154302" y="767171"/>
+            <a:ext cx="405516" cy="103034"/>
+          </a:xfrm>
+          <a:prstGeom prst="ellipse">
+            <a:avLst/>
+          </a:prstGeom>
+          <a:noFill/>
+          <a:ln w="19050">
+            <a:solidFill>
+              <a:schemeClr val="tx1"/>
+            </a:solidFill>
+          </a:ln>
+        </p:spPr>
+        <p:style>
+          <a:lnRef idx="2">
+            <a:schemeClr val="accent1">
+              <a:shade val="50000"/>
+            </a:schemeClr>
+          </a:lnRef>
+          <a:fillRef idx="1">
+            <a:schemeClr val="accent1"/>
+          </a:fillRef>
+          <a:effectRef idx="0">
+            <a:schemeClr val="accent1"/>
+          </a:effectRef>
+          <a:fontRef idx="minor">
+            <a:schemeClr val="lt1"/>
+          </a:fontRef>
+        </p:style>
+        <p:txBody>
+          <a:bodyPr rtlCol="0" anchor="ctr"/>
+          <a:lstStyle/>
+          <a:p>
+            <a:pPr algn="ctr"/>
+            <a:endParaRPr lang="en-CA"/>
+          </a:p>
+        </p:txBody>
+      </p:sp>
+      <p:sp>
+        <p:nvSpPr>
+          <p:cNvPr id="103" name="Oval 102"/>
+          <p:cNvSpPr/>
+          <p:nvPr/>
+        </p:nvSpPr>
+        <p:spPr>
+          <a:xfrm>
+            <a:off x="7847925" y="772768"/>
+            <a:ext cx="405516" cy="103034"/>
+          </a:xfrm>
+          <a:prstGeom prst="ellipse">
+            <a:avLst/>
+          </a:prstGeom>
+          <a:noFill/>
+          <a:ln w="19050">
+            <a:solidFill>
+              <a:srgbClr val="FF0000"/>
+            </a:solidFill>
+          </a:ln>
+        </p:spPr>
+        <p:style>
+          <a:lnRef idx="2">
+            <a:schemeClr val="accent1">
+              <a:shade val="50000"/>
+            </a:schemeClr>
+          </a:lnRef>
+          <a:fillRef idx="1">
+            <a:schemeClr val="accent1"/>
+          </a:fillRef>
+          <a:effectRef idx="0">
+            <a:schemeClr val="accent1"/>
+          </a:effectRef>
+          <a:fontRef idx="minor">
+            <a:schemeClr val="lt1"/>
+          </a:fontRef>
+        </p:style>
+        <p:txBody>
+          <a:bodyPr rtlCol="0" anchor="ctr"/>
+          <a:lstStyle/>
+          <a:p>
+            <a:pPr algn="ctr"/>
+            <a:endParaRPr lang="en-CA"/>
+          </a:p>
+        </p:txBody>
+      </p:sp>
+      <p:sp>
+        <p:nvSpPr>
+          <p:cNvPr id="104" name="Oval 103"/>
+          <p:cNvSpPr/>
+          <p:nvPr/>
+        </p:nvSpPr>
+        <p:spPr>
+          <a:xfrm>
+            <a:off x="8614301" y="777102"/>
+            <a:ext cx="405516" cy="103034"/>
+          </a:xfrm>
+          <a:prstGeom prst="ellipse">
+            <a:avLst/>
+          </a:prstGeom>
+          <a:noFill/>
+          <a:ln w="19050">
+            <a:solidFill>
+              <a:schemeClr val="tx1"/>
+            </a:solidFill>
+          </a:ln>
+        </p:spPr>
+        <p:style>
+          <a:lnRef idx="2">
+            <a:schemeClr val="accent1">
+              <a:shade val="50000"/>
+            </a:schemeClr>
+          </a:lnRef>
+          <a:fillRef idx="1">
+            <a:schemeClr val="accent1"/>
+          </a:fillRef>
+          <a:effectRef idx="0">
+            <a:schemeClr val="accent1"/>
+          </a:effectRef>
+          <a:fontRef idx="minor">
+            <a:schemeClr val="lt1"/>
+          </a:fontRef>
+        </p:style>
+        <p:txBody>
+          <a:bodyPr rtlCol="0" anchor="ctr"/>
+          <a:lstStyle/>
+          <a:p>
+            <a:pPr algn="ctr"/>
+            <a:endParaRPr lang="en-CA"/>
+          </a:p>
+        </p:txBody>
+      </p:sp>
+      <p:sp>
+        <p:nvSpPr>
+          <p:cNvPr id="105" name="Oval 104"/>
+          <p:cNvSpPr/>
+          <p:nvPr/>
+        </p:nvSpPr>
+        <p:spPr>
+          <a:xfrm>
+            <a:off x="10167438" y="762806"/>
+            <a:ext cx="405516" cy="103034"/>
+          </a:xfrm>
+          <a:prstGeom prst="ellipse">
+            <a:avLst/>
+          </a:prstGeom>
+          <a:noFill/>
+          <a:ln w="19050">
+            <a:solidFill>
+              <a:srgbClr val="FF0000"/>
+            </a:solidFill>
+          </a:ln>
+        </p:spPr>
+        <p:style>
+          <a:lnRef idx="2">
+            <a:schemeClr val="accent1">
+              <a:shade val="50000"/>
+            </a:schemeClr>
+          </a:lnRef>
+          <a:fillRef idx="1">
+            <a:schemeClr val="accent1"/>
+          </a:fillRef>
+          <a:effectRef idx="0">
+            <a:schemeClr val="accent1"/>
+          </a:effectRef>
+          <a:fontRef idx="minor">
+            <a:schemeClr val="lt1"/>
+          </a:fontRef>
+        </p:style>
+        <p:txBody>
+          <a:bodyPr rtlCol="0" anchor="ctr"/>
+          <a:lstStyle/>
+          <a:p>
+            <a:pPr algn="ctr"/>
+            <a:endParaRPr lang="en-CA"/>
+          </a:p>
+        </p:txBody>
+      </p:sp>
+      <p:sp>
+        <p:nvSpPr>
+          <p:cNvPr id="106" name="Oval 105"/>
+          <p:cNvSpPr/>
+          <p:nvPr/>
+        </p:nvSpPr>
+        <p:spPr>
+          <a:xfrm>
+            <a:off x="10933814" y="767140"/>
+            <a:ext cx="405516" cy="103034"/>
+          </a:xfrm>
+          <a:prstGeom prst="ellipse">
+            <a:avLst/>
+          </a:prstGeom>
+          <a:noFill/>
+          <a:ln w="19050">
+            <a:solidFill>
+              <a:schemeClr val="tx1"/>
+            </a:solidFill>
+          </a:ln>
+        </p:spPr>
+        <p:style>
+          <a:lnRef idx="2">
+            <a:schemeClr val="accent1">
+              <a:shade val="50000"/>
+            </a:schemeClr>
+          </a:lnRef>
+          <a:fillRef idx="1">
+            <a:schemeClr val="accent1"/>
+          </a:fillRef>
+          <a:effectRef idx="0">
+            <a:schemeClr val="accent1"/>
+          </a:effectRef>
+          <a:fontRef idx="minor">
+            <a:schemeClr val="lt1"/>
+          </a:fontRef>
+        </p:style>
+        <p:txBody>
+          <a:bodyPr rtlCol="0" anchor="ctr"/>
+          <a:lstStyle/>
+          <a:p>
+            <a:pPr algn="ctr"/>
+            <a:endParaRPr lang="en-CA"/>
+          </a:p>
+        </p:txBody>
+      </p:sp>
+      <p:sp>
+        <p:nvSpPr>
+          <p:cNvPr id="107" name="TextBox 106"/>
+          <p:cNvSpPr txBox="1"/>
+          <p:nvPr/>
+        </p:nvSpPr>
+        <p:spPr>
+          <a:xfrm>
+            <a:off x="4941665" y="94927"/>
+            <a:ext cx="1046518" cy="307777"/>
+          </a:xfrm>
+          <a:prstGeom prst="rect">
+            <a:avLst/>
+          </a:prstGeom>
+          <a:noFill/>
+        </p:spPr>
+        <p:txBody>
+          <a:bodyPr wrap="square" rtlCol="0">
+            <a:spAutoFit/>
+          </a:bodyPr>
+          <a:lstStyle/>
+          <a:p>
+            <a:r>
+              <a:rPr lang="en-CA" sz="1400" b="1" dirty="0" smtClean="0"/>
+              <a:t>Sounding </a:t>
+            </a:r>
+            <a:r>
+              <a:rPr lang="en-CA" sz="1400" b="1" dirty="0"/>
+              <a:t>3</a:t>
+            </a:r>
+            <a:endParaRPr lang="en-CA" sz="1400" b="1" dirty="0"/>
+          </a:p>
+        </p:txBody>
+      </p:sp>
+      <p:sp>
+        <p:nvSpPr>
+          <p:cNvPr id="108" name="TextBox 107"/>
+          <p:cNvSpPr txBox="1"/>
+          <p:nvPr/>
+        </p:nvSpPr>
+        <p:spPr>
+          <a:xfrm>
+            <a:off x="7230805" y="104279"/>
+            <a:ext cx="1046518" cy="307777"/>
+          </a:xfrm>
+          <a:prstGeom prst="rect">
+            <a:avLst/>
+          </a:prstGeom>
+          <a:noFill/>
+        </p:spPr>
+        <p:txBody>
+          <a:bodyPr wrap="square" rtlCol="0">
+            <a:spAutoFit/>
+          </a:bodyPr>
+          <a:lstStyle/>
+          <a:p>
+            <a:r>
+              <a:rPr lang="en-CA" sz="1400" b="1" dirty="0" smtClean="0"/>
+              <a:t>Sounding </a:t>
+            </a:r>
+            <a:r>
+              <a:rPr lang="en-CA" sz="1400" b="1" dirty="0"/>
+              <a:t>4</a:t>
+            </a:r>
+            <a:endParaRPr lang="en-CA" sz="1400" b="1" dirty="0"/>
+          </a:p>
+        </p:txBody>
+      </p:sp>
+      <p:sp>
+        <p:nvSpPr>
+          <p:cNvPr id="109" name="TextBox 108"/>
+          <p:cNvSpPr txBox="1"/>
+          <p:nvPr/>
+        </p:nvSpPr>
+        <p:spPr>
+          <a:xfrm>
+            <a:off x="9554930" y="94927"/>
+            <a:ext cx="1046518" cy="307777"/>
+          </a:xfrm>
+          <a:prstGeom prst="rect">
+            <a:avLst/>
+          </a:prstGeom>
+          <a:noFill/>
+        </p:spPr>
+        <p:txBody>
+          <a:bodyPr wrap="square" rtlCol="0">
+            <a:spAutoFit/>
+          </a:bodyPr>
+          <a:lstStyle/>
+          <a:p>
+            <a:r>
+              <a:rPr lang="en-CA" sz="1400" b="1" dirty="0" smtClean="0"/>
+              <a:t>Sounding </a:t>
+            </a:r>
+            <a:r>
+              <a:rPr lang="en-CA" sz="1400" b="1" dirty="0"/>
+              <a:t>5</a:t>
+            </a:r>
+            <a:endParaRPr lang="en-CA" sz="1400" b="1" dirty="0"/>
+          </a:p>
+        </p:txBody>
+      </p:sp>
+    </p:spTree>
+    <p:extLst>
+      <p:ext uri="{BB962C8B-B14F-4D97-AF65-F5344CB8AC3E}">
+        <p14:creationId xmlns:p14="http://schemas.microsoft.com/office/powerpoint/2010/main" val="3120827858"/>
+      </p:ext>
+    </p:extLst>
+  </p:cSld>
+  <p:clrMapOvr>
+    <a:masterClrMapping/>
+  </p:clrMapOvr>
+</p:sld>
+</file>
+
 <file path=ppt/theme/theme1.xml><?xml version="1.0" encoding="utf-8"?>
 <a:theme xmlns:a="http://schemas.openxmlformats.org/drawingml/2006/main" name="Office Theme">
   <a:themeElements>

</xml_diff>